<commit_message>
presentation submitted, SHAP example
</commit_message>
<xml_diff>
--- a/Documentation/9. Features and classification results V2.pptx
+++ b/Documentation/9. Features and classification results V2.pptx
@@ -7954,7 +7954,7 @@
                   </a:schemeClr>
                 </a:solidFill>
               </a:rPr>
-              <a:t>Envelope feature</a:t>
+              <a:t>Envelope features</a:t>
             </a:r>
           </a:p>
           <a:p>
@@ -9015,7 +9015,7 @@
                   </a:schemeClr>
                 </a:solidFill>
               </a:rPr>
-              <a:t>Envelope feature</a:t>
+              <a:t>Envelope features</a:t>
             </a:r>
           </a:p>
           <a:p>
@@ -11686,7 +11686,7 @@
                   </a:schemeClr>
                 </a:solidFill>
               </a:rPr>
-              <a:t>Envelope feature</a:t>
+              <a:t>Envelope features</a:t>
             </a:r>
           </a:p>
           <a:p>
@@ -14311,7 +14311,7 @@
                   </a:schemeClr>
                 </a:solidFill>
               </a:rPr>
-              <a:t>Envelope feature</a:t>
+              <a:t>Envelope features</a:t>
             </a:r>
           </a:p>
           <a:p>
@@ -14523,7 +14523,7 @@
             <a:pPr lvl="1"/>
             <a:r>
               <a:rPr lang="en-US" sz="2000" dirty="0"/>
-              <a:t>Envelope feature</a:t>
+              <a:t>Envelope features</a:t>
             </a:r>
           </a:p>
           <a:p>
@@ -17090,128 +17090,6 @@
           </a:prstGeom>
         </p:spPr>
       </p:pic>
-      <p:sp>
-        <p:nvSpPr>
-          <p:cNvPr id="9" name="Rettangolo con angoli arrotondati 8">
-            <a:extLst>
-              <a:ext uri="{FF2B5EF4-FFF2-40B4-BE49-F238E27FC236}">
-                <a16:creationId xmlns:a16="http://schemas.microsoft.com/office/drawing/2014/main" id="{853F85AC-C2A6-F70C-4A6C-5C163FEDD349}"/>
-              </a:ext>
-            </a:extLst>
-          </p:cNvPr>
-          <p:cNvSpPr/>
-          <p:nvPr/>
-        </p:nvSpPr>
-        <p:spPr>
-          <a:xfrm>
-            <a:off x="4843274" y="5536253"/>
-            <a:ext cx="2505456" cy="761837"/>
-          </a:xfrm>
-          <a:prstGeom prst="roundRect">
-            <a:avLst/>
-          </a:prstGeom>
-          <a:solidFill>
-            <a:schemeClr val="bg1">
-              <a:lumMod val="95000"/>
-            </a:schemeClr>
-          </a:solidFill>
-          <a:ln>
-            <a:solidFill>
-              <a:srgbClr val="0070C0"/>
-            </a:solidFill>
-          </a:ln>
-        </p:spPr>
-        <p:style>
-          <a:lnRef idx="2">
-            <a:schemeClr val="accent1"/>
-          </a:lnRef>
-          <a:fillRef idx="1">
-            <a:schemeClr val="lt1"/>
-          </a:fillRef>
-          <a:effectRef idx="0">
-            <a:schemeClr val="accent1"/>
-          </a:effectRef>
-          <a:fontRef idx="minor">
-            <a:schemeClr val="dk1"/>
-          </a:fontRef>
-        </p:style>
-        <p:txBody>
-          <a:bodyPr rtlCol="0" anchor="ctr"/>
-          <a:lstStyle/>
-          <a:p>
-            <a:r>
-              <a:rPr lang="en-US" sz="1050" dirty="0"/>
-              <a:t>Of 847 signals: </a:t>
-            </a:r>
-          </a:p>
-          <a:p>
-            <a:pPr marL="171450" indent="-171450">
-              <a:buFont typeface="Arial" panose="020B0604020202020204" pitchFamily="34" charset="0"/>
-              <a:buChar char="•"/>
-            </a:pPr>
-            <a:r>
-              <a:rPr lang="en-US" sz="1050" dirty="0"/>
-              <a:t>663 are ineffective (</a:t>
-            </a:r>
-            <a:r>
-              <a:rPr lang="en-US" sz="1050" dirty="0">
-                <a:solidFill>
-                  <a:srgbClr val="0070C0"/>
-                </a:solidFill>
-              </a:rPr>
-              <a:t>MAP A</a:t>
-            </a:r>
-            <a:r>
-              <a:rPr lang="en-US" sz="1050" dirty="0"/>
-              <a:t>, 78.28%); </a:t>
-            </a:r>
-          </a:p>
-          <a:p>
-            <a:pPr marL="171450" indent="-171450">
-              <a:buFont typeface="Arial" panose="020B0604020202020204" pitchFamily="34" charset="0"/>
-              <a:buChar char="•"/>
-            </a:pPr>
-            <a:r>
-              <a:rPr lang="en-US" sz="1050" dirty="0"/>
-              <a:t>94 are effective (</a:t>
-            </a:r>
-            <a:r>
-              <a:rPr lang="en-US" sz="1050" dirty="0">
-                <a:solidFill>
-                  <a:srgbClr val="00B050"/>
-                </a:solidFill>
-              </a:rPr>
-              <a:t>MAP B</a:t>
-            </a:r>
-            <a:r>
-              <a:rPr lang="en-US" sz="1050" dirty="0"/>
-              <a:t>, 11.1%); </a:t>
-            </a:r>
-          </a:p>
-          <a:p>
-            <a:pPr marL="171450" indent="-171450">
-              <a:buFont typeface="Arial" panose="020B0604020202020204" pitchFamily="34" charset="0"/>
-              <a:buChar char="•"/>
-            </a:pPr>
-            <a:r>
-              <a:rPr lang="en-US" sz="1050" dirty="0"/>
-              <a:t>90 are dangerous (</a:t>
-            </a:r>
-            <a:r>
-              <a:rPr lang="en-US" sz="1050" dirty="0">
-                <a:solidFill>
-                  <a:srgbClr val="C00000"/>
-                </a:solidFill>
-              </a:rPr>
-              <a:t>MAP C</a:t>
-            </a:r>
-            <a:r>
-              <a:rPr lang="en-US" sz="1050" dirty="0"/>
-              <a:t>, 10.63%);</a:t>
-            </a:r>
-          </a:p>
-        </p:txBody>
-      </p:sp>
       <p:grpSp>
         <p:nvGrpSpPr>
           <p:cNvPr id="13" name="Gruppo 12">
@@ -17313,6 +17191,128 @@
           </p:style>
         </p:cxnSp>
       </p:grpSp>
+      <p:sp>
+        <p:nvSpPr>
+          <p:cNvPr id="9" name="Rettangolo con angoli arrotondati 8">
+            <a:extLst>
+              <a:ext uri="{FF2B5EF4-FFF2-40B4-BE49-F238E27FC236}">
+                <a16:creationId xmlns:a16="http://schemas.microsoft.com/office/drawing/2014/main" id="{853F85AC-C2A6-F70C-4A6C-5C163FEDD349}"/>
+              </a:ext>
+            </a:extLst>
+          </p:cNvPr>
+          <p:cNvSpPr/>
+          <p:nvPr/>
+        </p:nvSpPr>
+        <p:spPr>
+          <a:xfrm>
+            <a:off x="4843274" y="5536253"/>
+            <a:ext cx="2505456" cy="761837"/>
+          </a:xfrm>
+          <a:prstGeom prst="roundRect">
+            <a:avLst/>
+          </a:prstGeom>
+          <a:solidFill>
+            <a:schemeClr val="bg1">
+              <a:lumMod val="95000"/>
+            </a:schemeClr>
+          </a:solidFill>
+          <a:ln>
+            <a:solidFill>
+              <a:srgbClr val="0070C0"/>
+            </a:solidFill>
+          </a:ln>
+        </p:spPr>
+        <p:style>
+          <a:lnRef idx="2">
+            <a:schemeClr val="accent1"/>
+          </a:lnRef>
+          <a:fillRef idx="1">
+            <a:schemeClr val="lt1"/>
+          </a:fillRef>
+          <a:effectRef idx="0">
+            <a:schemeClr val="accent1"/>
+          </a:effectRef>
+          <a:fontRef idx="minor">
+            <a:schemeClr val="dk1"/>
+          </a:fontRef>
+        </p:style>
+        <p:txBody>
+          <a:bodyPr rtlCol="0" anchor="ctr"/>
+          <a:lstStyle/>
+          <a:p>
+            <a:r>
+              <a:rPr lang="en-US" sz="1050" dirty="0"/>
+              <a:t>Of 847 signals: </a:t>
+            </a:r>
+          </a:p>
+          <a:p>
+            <a:pPr marL="171450" indent="-171450">
+              <a:buFont typeface="Arial" panose="020B0604020202020204" pitchFamily="34" charset="0"/>
+              <a:buChar char="•"/>
+            </a:pPr>
+            <a:r>
+              <a:rPr lang="en-US" sz="1050" dirty="0"/>
+              <a:t>663 are ineffective (</a:t>
+            </a:r>
+            <a:r>
+              <a:rPr lang="en-US" sz="1050" dirty="0">
+                <a:solidFill>
+                  <a:srgbClr val="0070C0"/>
+                </a:solidFill>
+              </a:rPr>
+              <a:t>MAP A</a:t>
+            </a:r>
+            <a:r>
+              <a:rPr lang="en-US" sz="1050" dirty="0"/>
+              <a:t>, 78.28%); </a:t>
+            </a:r>
+          </a:p>
+          <a:p>
+            <a:pPr marL="171450" indent="-171450">
+              <a:buFont typeface="Arial" panose="020B0604020202020204" pitchFamily="34" charset="0"/>
+              <a:buChar char="•"/>
+            </a:pPr>
+            <a:r>
+              <a:rPr lang="en-US" sz="1050" dirty="0"/>
+              <a:t>94 are effective (</a:t>
+            </a:r>
+            <a:r>
+              <a:rPr lang="en-US" sz="1050" dirty="0">
+                <a:solidFill>
+                  <a:srgbClr val="00B050"/>
+                </a:solidFill>
+              </a:rPr>
+              <a:t>MAP B</a:t>
+            </a:r>
+            <a:r>
+              <a:rPr lang="en-US" sz="1050" dirty="0"/>
+              <a:t>, 11.1%); </a:t>
+            </a:r>
+          </a:p>
+          <a:p>
+            <a:pPr marL="171450" indent="-171450">
+              <a:buFont typeface="Arial" panose="020B0604020202020204" pitchFamily="34" charset="0"/>
+              <a:buChar char="•"/>
+            </a:pPr>
+            <a:r>
+              <a:rPr lang="en-US" sz="1050" dirty="0"/>
+              <a:t>90 are dangerous (</a:t>
+            </a:r>
+            <a:r>
+              <a:rPr lang="en-US" sz="1050" dirty="0">
+                <a:solidFill>
+                  <a:srgbClr val="C00000"/>
+                </a:solidFill>
+              </a:rPr>
+              <a:t>MAP C</a:t>
+            </a:r>
+            <a:r>
+              <a:rPr lang="en-US" sz="1050" dirty="0"/>
+              <a:t>, 10.63%);</a:t>
+            </a:r>
+          </a:p>
+        </p:txBody>
+      </p:sp>
     </p:spTree>
     <p:extLst>
       <p:ext uri="{BB962C8B-B14F-4D97-AF65-F5344CB8AC3E}">
@@ -18854,11 +18854,349 @@
   <p:clrMapOvr>
     <a:masterClrMapping/>
   </p:clrMapOvr>
+  <p:timing>
+    <p:tnLst>
+      <p:par>
+        <p:cTn id="1" dur="indefinite" restart="never" nodeType="tmRoot">
+          <p:childTnLst>
+            <p:seq concurrent="1" nextAc="seek">
+              <p:cTn id="2" dur="indefinite" nodeType="mainSeq">
+                <p:childTnLst>
+                  <p:par>
+                    <p:cTn id="3" fill="hold">
+                      <p:stCondLst>
+                        <p:cond delay="indefinite"/>
+                      </p:stCondLst>
+                      <p:childTnLst>
+                        <p:par>
+                          <p:cTn id="4" fill="hold">
+                            <p:stCondLst>
+                              <p:cond delay="0"/>
+                            </p:stCondLst>
+                            <p:childTnLst>
+                              <p:par>
+                                <p:cTn id="5" presetID="10" presetClass="entr" presetSubtype="0" fill="hold" grpId="0" nodeType="clickEffect">
+                                  <p:stCondLst>
+                                    <p:cond delay="0"/>
+                                  </p:stCondLst>
+                                  <p:childTnLst>
+                                    <p:set>
+                                      <p:cBhvr>
+                                        <p:cTn id="6" dur="1" fill="hold">
+                                          <p:stCondLst>
+                                            <p:cond delay="0"/>
+                                          </p:stCondLst>
+                                        </p:cTn>
+                                        <p:tgtEl>
+                                          <p:spTgt spid="19"/>
+                                        </p:tgtEl>
+                                        <p:attrNameLst>
+                                          <p:attrName>style.visibility</p:attrName>
+                                        </p:attrNameLst>
+                                      </p:cBhvr>
+                                      <p:to>
+                                        <p:strVal val="visible"/>
+                                      </p:to>
+                                    </p:set>
+                                    <p:animEffect transition="in" filter="fade">
+                                      <p:cBhvr>
+                                        <p:cTn id="7" dur="500"/>
+                                        <p:tgtEl>
+                                          <p:spTgt spid="19"/>
+                                        </p:tgtEl>
+                                      </p:cBhvr>
+                                    </p:animEffect>
+                                  </p:childTnLst>
+                                </p:cTn>
+                              </p:par>
+                              <p:par>
+                                <p:cTn id="8" presetID="10" presetClass="entr" presetSubtype="0" fill="hold" grpId="0" nodeType="withEffect">
+                                  <p:stCondLst>
+                                    <p:cond delay="0"/>
+                                  </p:stCondLst>
+                                  <p:childTnLst>
+                                    <p:set>
+                                      <p:cBhvr>
+                                        <p:cTn id="9" dur="1" fill="hold">
+                                          <p:stCondLst>
+                                            <p:cond delay="0"/>
+                                          </p:stCondLst>
+                                        </p:cTn>
+                                        <p:tgtEl>
+                                          <p:spTgt spid="13"/>
+                                        </p:tgtEl>
+                                        <p:attrNameLst>
+                                          <p:attrName>style.visibility</p:attrName>
+                                        </p:attrNameLst>
+                                      </p:cBhvr>
+                                      <p:to>
+                                        <p:strVal val="visible"/>
+                                      </p:to>
+                                    </p:set>
+                                    <p:animEffect transition="in" filter="fade">
+                                      <p:cBhvr>
+                                        <p:cTn id="10" dur="500"/>
+                                        <p:tgtEl>
+                                          <p:spTgt spid="13"/>
+                                        </p:tgtEl>
+                                      </p:cBhvr>
+                                    </p:animEffect>
+                                  </p:childTnLst>
+                                </p:cTn>
+                              </p:par>
+                              <p:par>
+                                <p:cTn id="11" presetID="10" presetClass="entr" presetSubtype="0" fill="hold" grpId="0" nodeType="withEffect">
+                                  <p:stCondLst>
+                                    <p:cond delay="0"/>
+                                  </p:stCondLst>
+                                  <p:childTnLst>
+                                    <p:set>
+                                      <p:cBhvr>
+                                        <p:cTn id="12" dur="1" fill="hold">
+                                          <p:stCondLst>
+                                            <p:cond delay="0"/>
+                                          </p:stCondLst>
+                                        </p:cTn>
+                                        <p:tgtEl>
+                                          <p:spTgt spid="14"/>
+                                        </p:tgtEl>
+                                        <p:attrNameLst>
+                                          <p:attrName>style.visibility</p:attrName>
+                                        </p:attrNameLst>
+                                      </p:cBhvr>
+                                      <p:to>
+                                        <p:strVal val="visible"/>
+                                      </p:to>
+                                    </p:set>
+                                    <p:animEffect transition="in" filter="fade">
+                                      <p:cBhvr>
+                                        <p:cTn id="13" dur="500"/>
+                                        <p:tgtEl>
+                                          <p:spTgt spid="14"/>
+                                        </p:tgtEl>
+                                      </p:cBhvr>
+                                    </p:animEffect>
+                                  </p:childTnLst>
+                                </p:cTn>
+                              </p:par>
+                              <p:par>
+                                <p:cTn id="14" presetID="10" presetClass="entr" presetSubtype="0" fill="hold" grpId="0" nodeType="withEffect">
+                                  <p:stCondLst>
+                                    <p:cond delay="0"/>
+                                  </p:stCondLst>
+                                  <p:childTnLst>
+                                    <p:set>
+                                      <p:cBhvr>
+                                        <p:cTn id="15" dur="1" fill="hold">
+                                          <p:stCondLst>
+                                            <p:cond delay="0"/>
+                                          </p:stCondLst>
+                                        </p:cTn>
+                                        <p:tgtEl>
+                                          <p:spTgt spid="18"/>
+                                        </p:tgtEl>
+                                        <p:attrNameLst>
+                                          <p:attrName>style.visibility</p:attrName>
+                                        </p:attrNameLst>
+                                      </p:cBhvr>
+                                      <p:to>
+                                        <p:strVal val="visible"/>
+                                      </p:to>
+                                    </p:set>
+                                    <p:animEffect transition="in" filter="fade">
+                                      <p:cBhvr>
+                                        <p:cTn id="16" dur="500"/>
+                                        <p:tgtEl>
+                                          <p:spTgt spid="18"/>
+                                        </p:tgtEl>
+                                      </p:cBhvr>
+                                    </p:animEffect>
+                                  </p:childTnLst>
+                                </p:cTn>
+                              </p:par>
+                              <p:par>
+                                <p:cTn id="17" presetID="10" presetClass="entr" presetSubtype="0" fill="hold" grpId="0" nodeType="withEffect">
+                                  <p:stCondLst>
+                                    <p:cond delay="0"/>
+                                  </p:stCondLst>
+                                  <p:childTnLst>
+                                    <p:set>
+                                      <p:cBhvr>
+                                        <p:cTn id="18" dur="1" fill="hold">
+                                          <p:stCondLst>
+                                            <p:cond delay="0"/>
+                                          </p:stCondLst>
+                                        </p:cTn>
+                                        <p:tgtEl>
+                                          <p:spTgt spid="15"/>
+                                        </p:tgtEl>
+                                        <p:attrNameLst>
+                                          <p:attrName>style.visibility</p:attrName>
+                                        </p:attrNameLst>
+                                      </p:cBhvr>
+                                      <p:to>
+                                        <p:strVal val="visible"/>
+                                      </p:to>
+                                    </p:set>
+                                    <p:animEffect transition="in" filter="fade">
+                                      <p:cBhvr>
+                                        <p:cTn id="19" dur="500"/>
+                                        <p:tgtEl>
+                                          <p:spTgt spid="15"/>
+                                        </p:tgtEl>
+                                      </p:cBhvr>
+                                    </p:animEffect>
+                                  </p:childTnLst>
+                                </p:cTn>
+                              </p:par>
+                              <p:par>
+                                <p:cTn id="20" presetID="10" presetClass="entr" presetSubtype="0" fill="hold" grpId="0" nodeType="withEffect">
+                                  <p:stCondLst>
+                                    <p:cond delay="0"/>
+                                  </p:stCondLst>
+                                  <p:childTnLst>
+                                    <p:set>
+                                      <p:cBhvr>
+                                        <p:cTn id="21" dur="1" fill="hold">
+                                          <p:stCondLst>
+                                            <p:cond delay="0"/>
+                                          </p:stCondLst>
+                                        </p:cTn>
+                                        <p:tgtEl>
+                                          <p:spTgt spid="16"/>
+                                        </p:tgtEl>
+                                        <p:attrNameLst>
+                                          <p:attrName>style.visibility</p:attrName>
+                                        </p:attrNameLst>
+                                      </p:cBhvr>
+                                      <p:to>
+                                        <p:strVal val="visible"/>
+                                      </p:to>
+                                    </p:set>
+                                    <p:animEffect transition="in" filter="fade">
+                                      <p:cBhvr>
+                                        <p:cTn id="22" dur="500"/>
+                                        <p:tgtEl>
+                                          <p:spTgt spid="16"/>
+                                        </p:tgtEl>
+                                      </p:cBhvr>
+                                    </p:animEffect>
+                                  </p:childTnLst>
+                                </p:cTn>
+                              </p:par>
+                              <p:par>
+                                <p:cTn id="23" presetID="10" presetClass="entr" presetSubtype="0" fill="hold" grpId="0" nodeType="withEffect">
+                                  <p:stCondLst>
+                                    <p:cond delay="0"/>
+                                  </p:stCondLst>
+                                  <p:childTnLst>
+                                    <p:set>
+                                      <p:cBhvr>
+                                        <p:cTn id="24" dur="1" fill="hold">
+                                          <p:stCondLst>
+                                            <p:cond delay="0"/>
+                                          </p:stCondLst>
+                                        </p:cTn>
+                                        <p:tgtEl>
+                                          <p:spTgt spid="20"/>
+                                        </p:tgtEl>
+                                        <p:attrNameLst>
+                                          <p:attrName>style.visibility</p:attrName>
+                                        </p:attrNameLst>
+                                      </p:cBhvr>
+                                      <p:to>
+                                        <p:strVal val="visible"/>
+                                      </p:to>
+                                    </p:set>
+                                    <p:animEffect transition="in" filter="fade">
+                                      <p:cBhvr>
+                                        <p:cTn id="25" dur="500"/>
+                                        <p:tgtEl>
+                                          <p:spTgt spid="20"/>
+                                        </p:tgtEl>
+                                      </p:cBhvr>
+                                    </p:animEffect>
+                                  </p:childTnLst>
+                                </p:cTn>
+                              </p:par>
+                              <p:par>
+                                <p:cTn id="26" presetID="10" presetClass="entr" presetSubtype="0" fill="hold" grpId="0" nodeType="withEffect">
+                                  <p:stCondLst>
+                                    <p:cond delay="0"/>
+                                  </p:stCondLst>
+                                  <p:childTnLst>
+                                    <p:set>
+                                      <p:cBhvr>
+                                        <p:cTn id="27" dur="1" fill="hold">
+                                          <p:stCondLst>
+                                            <p:cond delay="0"/>
+                                          </p:stCondLst>
+                                        </p:cTn>
+                                        <p:tgtEl>
+                                          <p:spTgt spid="17"/>
+                                        </p:tgtEl>
+                                        <p:attrNameLst>
+                                          <p:attrName>style.visibility</p:attrName>
+                                        </p:attrNameLst>
+                                      </p:cBhvr>
+                                      <p:to>
+                                        <p:strVal val="visible"/>
+                                      </p:to>
+                                    </p:set>
+                                    <p:animEffect transition="in" filter="fade">
+                                      <p:cBhvr>
+                                        <p:cTn id="28" dur="500"/>
+                                        <p:tgtEl>
+                                          <p:spTgt spid="17"/>
+                                        </p:tgtEl>
+                                      </p:cBhvr>
+                                    </p:animEffect>
+                                  </p:childTnLst>
+                                </p:cTn>
+                              </p:par>
+                            </p:childTnLst>
+                          </p:cTn>
+                        </p:par>
+                      </p:childTnLst>
+                    </p:cTn>
+                  </p:par>
+                </p:childTnLst>
+              </p:cTn>
+              <p:prevCondLst>
+                <p:cond evt="onPrev" delay="0">
+                  <p:tgtEl>
+                    <p:sldTgt/>
+                  </p:tgtEl>
+                </p:cond>
+              </p:prevCondLst>
+              <p:nextCondLst>
+                <p:cond evt="onNext" delay="0">
+                  <p:tgtEl>
+                    <p:sldTgt/>
+                  </p:tgtEl>
+                </p:cond>
+              </p:nextCondLst>
+            </p:seq>
+          </p:childTnLst>
+        </p:cTn>
+      </p:par>
+    </p:tnLst>
+    <p:bldLst>
+      <p:bldP spid="13" grpId="0" animBg="1"/>
+      <p:bldP spid="14" grpId="0" animBg="1"/>
+      <p:bldP spid="15" grpId="0" animBg="1"/>
+      <p:bldP spid="16" grpId="0" animBg="1"/>
+      <p:bldP spid="17" grpId="0" animBg="1"/>
+      <p:bldP spid="18" grpId="0" animBg="1"/>
+      <p:bldP spid="19" grpId="0" animBg="1"/>
+      <p:bldP spid="20" grpId="0" animBg="1"/>
+    </p:bldLst>
+  </p:timing>
 </p:sld>
 </file>
 
 <file path=ppt/slides/slide26.xml><?xml version="1.0" encoding="utf-8"?>
-<p:sld xmlns:a="http://schemas.openxmlformats.org/drawingml/2006/main" xmlns:r="http://schemas.openxmlformats.org/officeDocument/2006/relationships" xmlns:p="http://schemas.openxmlformats.org/presentationml/2006/main">
+<p:sld xmlns:a="http://schemas.openxmlformats.org/drawingml/2006/main" xmlns:r="http://schemas.openxmlformats.org/officeDocument/2006/relationships" xmlns:p="http://schemas.openxmlformats.org/presentationml/2006/main" show="0">
   <p:cSld>
     <p:spTree>
       <p:nvGrpSpPr>
@@ -20044,7 +20382,7 @@
                   </a:schemeClr>
                 </a:solidFill>
               </a:rPr>
-              <a:t>Envelope feature</a:t>
+              <a:t>Envelope features</a:t>
             </a:r>
           </a:p>
           <a:p>
@@ -20651,7 +20989,7 @@
             <a:pPr lvl="1"/>
             <a:r>
               <a:rPr lang="en-US" sz="2000" dirty="0"/>
-              <a:t>Envelope feature</a:t>
+              <a:t>Envelope features</a:t>
             </a:r>
           </a:p>
           <a:p>
@@ -22746,640 +23084,6 @@
   <p:clrMapOvr>
     <a:masterClrMapping/>
   </p:clrMapOvr>
-  <p:timing>
-    <p:tnLst>
-      <p:par>
-        <p:cTn id="1" dur="indefinite" restart="never" nodeType="tmRoot">
-          <p:childTnLst>
-            <p:seq concurrent="1" nextAc="seek">
-              <p:cTn id="2" dur="indefinite" nodeType="mainSeq">
-                <p:childTnLst>
-                  <p:par>
-                    <p:cTn id="3" fill="hold">
-                      <p:stCondLst>
-                        <p:cond delay="indefinite"/>
-                      </p:stCondLst>
-                      <p:childTnLst>
-                        <p:par>
-                          <p:cTn id="4" fill="hold">
-                            <p:stCondLst>
-                              <p:cond delay="0"/>
-                            </p:stCondLst>
-                            <p:childTnLst>
-                              <p:par>
-                                <p:cTn id="5" presetID="2" presetClass="entr" presetSubtype="4" fill="hold" nodeType="clickEffect">
-                                  <p:stCondLst>
-                                    <p:cond delay="0"/>
-                                  </p:stCondLst>
-                                  <p:childTnLst>
-                                    <p:set>
-                                      <p:cBhvr>
-                                        <p:cTn id="6" dur="1" fill="hold">
-                                          <p:stCondLst>
-                                            <p:cond delay="0"/>
-                                          </p:stCondLst>
-                                        </p:cTn>
-                                        <p:tgtEl>
-                                          <p:spTgt spid="9">
-                                            <p:txEl>
-                                              <p:pRg st="3" end="3"/>
-                                            </p:txEl>
-                                          </p:spTgt>
-                                        </p:tgtEl>
-                                        <p:attrNameLst>
-                                          <p:attrName>style.visibility</p:attrName>
-                                        </p:attrNameLst>
-                                      </p:cBhvr>
-                                      <p:to>
-                                        <p:strVal val="visible"/>
-                                      </p:to>
-                                    </p:set>
-                                    <p:anim calcmode="lin" valueType="num">
-                                      <p:cBhvr additive="base">
-                                        <p:cTn id="7" dur="500" fill="hold"/>
-                                        <p:tgtEl>
-                                          <p:spTgt spid="9">
-                                            <p:txEl>
-                                              <p:pRg st="3" end="3"/>
-                                            </p:txEl>
-                                          </p:spTgt>
-                                        </p:tgtEl>
-                                        <p:attrNameLst>
-                                          <p:attrName>ppt_x</p:attrName>
-                                        </p:attrNameLst>
-                                      </p:cBhvr>
-                                      <p:tavLst>
-                                        <p:tav tm="0">
-                                          <p:val>
-                                            <p:strVal val="#ppt_x"/>
-                                          </p:val>
-                                        </p:tav>
-                                        <p:tav tm="100000">
-                                          <p:val>
-                                            <p:strVal val="#ppt_x"/>
-                                          </p:val>
-                                        </p:tav>
-                                      </p:tavLst>
-                                    </p:anim>
-                                    <p:anim calcmode="lin" valueType="num">
-                                      <p:cBhvr additive="base">
-                                        <p:cTn id="8" dur="500" fill="hold"/>
-                                        <p:tgtEl>
-                                          <p:spTgt spid="9">
-                                            <p:txEl>
-                                              <p:pRg st="3" end="3"/>
-                                            </p:txEl>
-                                          </p:spTgt>
-                                        </p:tgtEl>
-                                        <p:attrNameLst>
-                                          <p:attrName>ppt_y</p:attrName>
-                                        </p:attrNameLst>
-                                      </p:cBhvr>
-                                      <p:tavLst>
-                                        <p:tav tm="0">
-                                          <p:val>
-                                            <p:strVal val="1+#ppt_h/2"/>
-                                          </p:val>
-                                        </p:tav>
-                                        <p:tav tm="100000">
-                                          <p:val>
-                                            <p:strVal val="#ppt_y"/>
-                                          </p:val>
-                                        </p:tav>
-                                      </p:tavLst>
-                                    </p:anim>
-                                  </p:childTnLst>
-                                </p:cTn>
-                              </p:par>
-                              <p:par>
-                                <p:cTn id="9" presetID="2" presetClass="entr" presetSubtype="4" fill="hold" nodeType="withEffect">
-                                  <p:stCondLst>
-                                    <p:cond delay="0"/>
-                                  </p:stCondLst>
-                                  <p:childTnLst>
-                                    <p:set>
-                                      <p:cBhvr>
-                                        <p:cTn id="10" dur="1" fill="hold">
-                                          <p:stCondLst>
-                                            <p:cond delay="0"/>
-                                          </p:stCondLst>
-                                        </p:cTn>
-                                        <p:tgtEl>
-                                          <p:spTgt spid="9">
-                                            <p:txEl>
-                                              <p:pRg st="4" end="4"/>
-                                            </p:txEl>
-                                          </p:spTgt>
-                                        </p:tgtEl>
-                                        <p:attrNameLst>
-                                          <p:attrName>style.visibility</p:attrName>
-                                        </p:attrNameLst>
-                                      </p:cBhvr>
-                                      <p:to>
-                                        <p:strVal val="visible"/>
-                                      </p:to>
-                                    </p:set>
-                                    <p:anim calcmode="lin" valueType="num">
-                                      <p:cBhvr additive="base">
-                                        <p:cTn id="11" dur="500" fill="hold"/>
-                                        <p:tgtEl>
-                                          <p:spTgt spid="9">
-                                            <p:txEl>
-                                              <p:pRg st="4" end="4"/>
-                                            </p:txEl>
-                                          </p:spTgt>
-                                        </p:tgtEl>
-                                        <p:attrNameLst>
-                                          <p:attrName>ppt_x</p:attrName>
-                                        </p:attrNameLst>
-                                      </p:cBhvr>
-                                      <p:tavLst>
-                                        <p:tav tm="0">
-                                          <p:val>
-                                            <p:strVal val="#ppt_x"/>
-                                          </p:val>
-                                        </p:tav>
-                                        <p:tav tm="100000">
-                                          <p:val>
-                                            <p:strVal val="#ppt_x"/>
-                                          </p:val>
-                                        </p:tav>
-                                      </p:tavLst>
-                                    </p:anim>
-                                    <p:anim calcmode="lin" valueType="num">
-                                      <p:cBhvr additive="base">
-                                        <p:cTn id="12" dur="500" fill="hold"/>
-                                        <p:tgtEl>
-                                          <p:spTgt spid="9">
-                                            <p:txEl>
-                                              <p:pRg st="4" end="4"/>
-                                            </p:txEl>
-                                          </p:spTgt>
-                                        </p:tgtEl>
-                                        <p:attrNameLst>
-                                          <p:attrName>ppt_y</p:attrName>
-                                        </p:attrNameLst>
-                                      </p:cBhvr>
-                                      <p:tavLst>
-                                        <p:tav tm="0">
-                                          <p:val>
-                                            <p:strVal val="1+#ppt_h/2"/>
-                                          </p:val>
-                                        </p:tav>
-                                        <p:tav tm="100000">
-                                          <p:val>
-                                            <p:strVal val="#ppt_y"/>
-                                          </p:val>
-                                        </p:tav>
-                                      </p:tavLst>
-                                    </p:anim>
-                                  </p:childTnLst>
-                                </p:cTn>
-                              </p:par>
-                              <p:par>
-                                <p:cTn id="13" presetID="2" presetClass="entr" presetSubtype="4" fill="hold" nodeType="withEffect">
-                                  <p:stCondLst>
-                                    <p:cond delay="0"/>
-                                  </p:stCondLst>
-                                  <p:childTnLst>
-                                    <p:set>
-                                      <p:cBhvr>
-                                        <p:cTn id="14" dur="1" fill="hold">
-                                          <p:stCondLst>
-                                            <p:cond delay="0"/>
-                                          </p:stCondLst>
-                                        </p:cTn>
-                                        <p:tgtEl>
-                                          <p:spTgt spid="9">
-                                            <p:txEl>
-                                              <p:pRg st="5" end="5"/>
-                                            </p:txEl>
-                                          </p:spTgt>
-                                        </p:tgtEl>
-                                        <p:attrNameLst>
-                                          <p:attrName>style.visibility</p:attrName>
-                                        </p:attrNameLst>
-                                      </p:cBhvr>
-                                      <p:to>
-                                        <p:strVal val="visible"/>
-                                      </p:to>
-                                    </p:set>
-                                    <p:anim calcmode="lin" valueType="num">
-                                      <p:cBhvr additive="base">
-                                        <p:cTn id="15" dur="500" fill="hold"/>
-                                        <p:tgtEl>
-                                          <p:spTgt spid="9">
-                                            <p:txEl>
-                                              <p:pRg st="5" end="5"/>
-                                            </p:txEl>
-                                          </p:spTgt>
-                                        </p:tgtEl>
-                                        <p:attrNameLst>
-                                          <p:attrName>ppt_x</p:attrName>
-                                        </p:attrNameLst>
-                                      </p:cBhvr>
-                                      <p:tavLst>
-                                        <p:tav tm="0">
-                                          <p:val>
-                                            <p:strVal val="#ppt_x"/>
-                                          </p:val>
-                                        </p:tav>
-                                        <p:tav tm="100000">
-                                          <p:val>
-                                            <p:strVal val="#ppt_x"/>
-                                          </p:val>
-                                        </p:tav>
-                                      </p:tavLst>
-                                    </p:anim>
-                                    <p:anim calcmode="lin" valueType="num">
-                                      <p:cBhvr additive="base">
-                                        <p:cTn id="16" dur="500" fill="hold"/>
-                                        <p:tgtEl>
-                                          <p:spTgt spid="9">
-                                            <p:txEl>
-                                              <p:pRg st="5" end="5"/>
-                                            </p:txEl>
-                                          </p:spTgt>
-                                        </p:tgtEl>
-                                        <p:attrNameLst>
-                                          <p:attrName>ppt_y</p:attrName>
-                                        </p:attrNameLst>
-                                      </p:cBhvr>
-                                      <p:tavLst>
-                                        <p:tav tm="0">
-                                          <p:val>
-                                            <p:strVal val="1+#ppt_h/2"/>
-                                          </p:val>
-                                        </p:tav>
-                                        <p:tav tm="100000">
-                                          <p:val>
-                                            <p:strVal val="#ppt_y"/>
-                                          </p:val>
-                                        </p:tav>
-                                      </p:tavLst>
-                                    </p:anim>
-                                  </p:childTnLst>
-                                </p:cTn>
-                              </p:par>
-                              <p:par>
-                                <p:cTn id="17" presetID="2" presetClass="entr" presetSubtype="4" fill="hold" nodeType="withEffect">
-                                  <p:stCondLst>
-                                    <p:cond delay="0"/>
-                                  </p:stCondLst>
-                                  <p:childTnLst>
-                                    <p:set>
-                                      <p:cBhvr>
-                                        <p:cTn id="18" dur="1" fill="hold">
-                                          <p:stCondLst>
-                                            <p:cond delay="0"/>
-                                          </p:stCondLst>
-                                        </p:cTn>
-                                        <p:tgtEl>
-                                          <p:spTgt spid="9">
-                                            <p:txEl>
-                                              <p:pRg st="6" end="6"/>
-                                            </p:txEl>
-                                          </p:spTgt>
-                                        </p:tgtEl>
-                                        <p:attrNameLst>
-                                          <p:attrName>style.visibility</p:attrName>
-                                        </p:attrNameLst>
-                                      </p:cBhvr>
-                                      <p:to>
-                                        <p:strVal val="visible"/>
-                                      </p:to>
-                                    </p:set>
-                                    <p:anim calcmode="lin" valueType="num">
-                                      <p:cBhvr additive="base">
-                                        <p:cTn id="19" dur="500" fill="hold"/>
-                                        <p:tgtEl>
-                                          <p:spTgt spid="9">
-                                            <p:txEl>
-                                              <p:pRg st="6" end="6"/>
-                                            </p:txEl>
-                                          </p:spTgt>
-                                        </p:tgtEl>
-                                        <p:attrNameLst>
-                                          <p:attrName>ppt_x</p:attrName>
-                                        </p:attrNameLst>
-                                      </p:cBhvr>
-                                      <p:tavLst>
-                                        <p:tav tm="0">
-                                          <p:val>
-                                            <p:strVal val="#ppt_x"/>
-                                          </p:val>
-                                        </p:tav>
-                                        <p:tav tm="100000">
-                                          <p:val>
-                                            <p:strVal val="#ppt_x"/>
-                                          </p:val>
-                                        </p:tav>
-                                      </p:tavLst>
-                                    </p:anim>
-                                    <p:anim calcmode="lin" valueType="num">
-                                      <p:cBhvr additive="base">
-                                        <p:cTn id="20" dur="500" fill="hold"/>
-                                        <p:tgtEl>
-                                          <p:spTgt spid="9">
-                                            <p:txEl>
-                                              <p:pRg st="6" end="6"/>
-                                            </p:txEl>
-                                          </p:spTgt>
-                                        </p:tgtEl>
-                                        <p:attrNameLst>
-                                          <p:attrName>ppt_y</p:attrName>
-                                        </p:attrNameLst>
-                                      </p:cBhvr>
-                                      <p:tavLst>
-                                        <p:tav tm="0">
-                                          <p:val>
-                                            <p:strVal val="1+#ppt_h/2"/>
-                                          </p:val>
-                                        </p:tav>
-                                        <p:tav tm="100000">
-                                          <p:val>
-                                            <p:strVal val="#ppt_y"/>
-                                          </p:val>
-                                        </p:tav>
-                                      </p:tavLst>
-                                    </p:anim>
-                                  </p:childTnLst>
-                                </p:cTn>
-                              </p:par>
-                              <p:par>
-                                <p:cTn id="21" presetID="2" presetClass="entr" presetSubtype="4" fill="hold" nodeType="withEffect">
-                                  <p:stCondLst>
-                                    <p:cond delay="0"/>
-                                  </p:stCondLst>
-                                  <p:childTnLst>
-                                    <p:set>
-                                      <p:cBhvr>
-                                        <p:cTn id="22" dur="1" fill="hold">
-                                          <p:stCondLst>
-                                            <p:cond delay="0"/>
-                                          </p:stCondLst>
-                                        </p:cTn>
-                                        <p:tgtEl>
-                                          <p:spTgt spid="9">
-                                            <p:txEl>
-                                              <p:pRg st="7" end="7"/>
-                                            </p:txEl>
-                                          </p:spTgt>
-                                        </p:tgtEl>
-                                        <p:attrNameLst>
-                                          <p:attrName>style.visibility</p:attrName>
-                                        </p:attrNameLst>
-                                      </p:cBhvr>
-                                      <p:to>
-                                        <p:strVal val="visible"/>
-                                      </p:to>
-                                    </p:set>
-                                    <p:anim calcmode="lin" valueType="num">
-                                      <p:cBhvr additive="base">
-                                        <p:cTn id="23" dur="500" fill="hold"/>
-                                        <p:tgtEl>
-                                          <p:spTgt spid="9">
-                                            <p:txEl>
-                                              <p:pRg st="7" end="7"/>
-                                            </p:txEl>
-                                          </p:spTgt>
-                                        </p:tgtEl>
-                                        <p:attrNameLst>
-                                          <p:attrName>ppt_x</p:attrName>
-                                        </p:attrNameLst>
-                                      </p:cBhvr>
-                                      <p:tavLst>
-                                        <p:tav tm="0">
-                                          <p:val>
-                                            <p:strVal val="#ppt_x"/>
-                                          </p:val>
-                                        </p:tav>
-                                        <p:tav tm="100000">
-                                          <p:val>
-                                            <p:strVal val="#ppt_x"/>
-                                          </p:val>
-                                        </p:tav>
-                                      </p:tavLst>
-                                    </p:anim>
-                                    <p:anim calcmode="lin" valueType="num">
-                                      <p:cBhvr additive="base">
-                                        <p:cTn id="24" dur="500" fill="hold"/>
-                                        <p:tgtEl>
-                                          <p:spTgt spid="9">
-                                            <p:txEl>
-                                              <p:pRg st="7" end="7"/>
-                                            </p:txEl>
-                                          </p:spTgt>
-                                        </p:tgtEl>
-                                        <p:attrNameLst>
-                                          <p:attrName>ppt_y</p:attrName>
-                                        </p:attrNameLst>
-                                      </p:cBhvr>
-                                      <p:tavLst>
-                                        <p:tav tm="0">
-                                          <p:val>
-                                            <p:strVal val="1+#ppt_h/2"/>
-                                          </p:val>
-                                        </p:tav>
-                                        <p:tav tm="100000">
-                                          <p:val>
-                                            <p:strVal val="#ppt_y"/>
-                                          </p:val>
-                                        </p:tav>
-                                      </p:tavLst>
-                                    </p:anim>
-                                  </p:childTnLst>
-                                </p:cTn>
-                              </p:par>
-                              <p:par>
-                                <p:cTn id="25" presetID="2" presetClass="entr" presetSubtype="4" fill="hold" nodeType="withEffect">
-                                  <p:stCondLst>
-                                    <p:cond delay="0"/>
-                                  </p:stCondLst>
-                                  <p:childTnLst>
-                                    <p:set>
-                                      <p:cBhvr>
-                                        <p:cTn id="26" dur="1" fill="hold">
-                                          <p:stCondLst>
-                                            <p:cond delay="0"/>
-                                          </p:stCondLst>
-                                        </p:cTn>
-                                        <p:tgtEl>
-                                          <p:spTgt spid="9">
-                                            <p:txEl>
-                                              <p:pRg st="8" end="8"/>
-                                            </p:txEl>
-                                          </p:spTgt>
-                                        </p:tgtEl>
-                                        <p:attrNameLst>
-                                          <p:attrName>style.visibility</p:attrName>
-                                        </p:attrNameLst>
-                                      </p:cBhvr>
-                                      <p:to>
-                                        <p:strVal val="visible"/>
-                                      </p:to>
-                                    </p:set>
-                                    <p:anim calcmode="lin" valueType="num">
-                                      <p:cBhvr additive="base">
-                                        <p:cTn id="27" dur="500" fill="hold"/>
-                                        <p:tgtEl>
-                                          <p:spTgt spid="9">
-                                            <p:txEl>
-                                              <p:pRg st="8" end="8"/>
-                                            </p:txEl>
-                                          </p:spTgt>
-                                        </p:tgtEl>
-                                        <p:attrNameLst>
-                                          <p:attrName>ppt_x</p:attrName>
-                                        </p:attrNameLst>
-                                      </p:cBhvr>
-                                      <p:tavLst>
-                                        <p:tav tm="0">
-                                          <p:val>
-                                            <p:strVal val="#ppt_x"/>
-                                          </p:val>
-                                        </p:tav>
-                                        <p:tav tm="100000">
-                                          <p:val>
-                                            <p:strVal val="#ppt_x"/>
-                                          </p:val>
-                                        </p:tav>
-                                      </p:tavLst>
-                                    </p:anim>
-                                    <p:anim calcmode="lin" valueType="num">
-                                      <p:cBhvr additive="base">
-                                        <p:cTn id="28" dur="500" fill="hold"/>
-                                        <p:tgtEl>
-                                          <p:spTgt spid="9">
-                                            <p:txEl>
-                                              <p:pRg st="8" end="8"/>
-                                            </p:txEl>
-                                          </p:spTgt>
-                                        </p:tgtEl>
-                                        <p:attrNameLst>
-                                          <p:attrName>ppt_y</p:attrName>
-                                        </p:attrNameLst>
-                                      </p:cBhvr>
-                                      <p:tavLst>
-                                        <p:tav tm="0">
-                                          <p:val>
-                                            <p:strVal val="1+#ppt_h/2"/>
-                                          </p:val>
-                                        </p:tav>
-                                        <p:tav tm="100000">
-                                          <p:val>
-                                            <p:strVal val="#ppt_y"/>
-                                          </p:val>
-                                        </p:tav>
-                                      </p:tavLst>
-                                    </p:anim>
-                                  </p:childTnLst>
-                                </p:cTn>
-                              </p:par>
-                              <p:par>
-                                <p:cTn id="29" presetID="2" presetClass="entr" presetSubtype="4" fill="hold" grpId="0" nodeType="withEffect">
-                                  <p:stCondLst>
-                                    <p:cond delay="0"/>
-                                  </p:stCondLst>
-                                  <p:childTnLst>
-                                    <p:set>
-                                      <p:cBhvr>
-                                        <p:cTn id="30" dur="1" fill="hold">
-                                          <p:stCondLst>
-                                            <p:cond delay="0"/>
-                                          </p:stCondLst>
-                                        </p:cTn>
-                                        <p:tgtEl>
-                                          <p:spTgt spid="6"/>
-                                        </p:tgtEl>
-                                        <p:attrNameLst>
-                                          <p:attrName>style.visibility</p:attrName>
-                                        </p:attrNameLst>
-                                      </p:cBhvr>
-                                      <p:to>
-                                        <p:strVal val="visible"/>
-                                      </p:to>
-                                    </p:set>
-                                    <p:anim calcmode="lin" valueType="num">
-                                      <p:cBhvr additive="base">
-                                        <p:cTn id="31" dur="500" fill="hold"/>
-                                        <p:tgtEl>
-                                          <p:spTgt spid="6"/>
-                                        </p:tgtEl>
-                                        <p:attrNameLst>
-                                          <p:attrName>ppt_x</p:attrName>
-                                        </p:attrNameLst>
-                                      </p:cBhvr>
-                                      <p:tavLst>
-                                        <p:tav tm="0">
-                                          <p:val>
-                                            <p:strVal val="#ppt_x"/>
-                                          </p:val>
-                                        </p:tav>
-                                        <p:tav tm="100000">
-                                          <p:val>
-                                            <p:strVal val="#ppt_x"/>
-                                          </p:val>
-                                        </p:tav>
-                                      </p:tavLst>
-                                    </p:anim>
-                                    <p:anim calcmode="lin" valueType="num">
-                                      <p:cBhvr additive="base">
-                                        <p:cTn id="32" dur="500" fill="hold"/>
-                                        <p:tgtEl>
-                                          <p:spTgt spid="6"/>
-                                        </p:tgtEl>
-                                        <p:attrNameLst>
-                                          <p:attrName>ppt_y</p:attrName>
-                                        </p:attrNameLst>
-                                      </p:cBhvr>
-                                      <p:tavLst>
-                                        <p:tav tm="0">
-                                          <p:val>
-                                            <p:strVal val="1+#ppt_h/2"/>
-                                          </p:val>
-                                        </p:tav>
-                                        <p:tav tm="100000">
-                                          <p:val>
-                                            <p:strVal val="#ppt_y"/>
-                                          </p:val>
-                                        </p:tav>
-                                      </p:tavLst>
-                                    </p:anim>
-                                  </p:childTnLst>
-                                </p:cTn>
-                              </p:par>
-                            </p:childTnLst>
-                          </p:cTn>
-                        </p:par>
-                      </p:childTnLst>
-                    </p:cTn>
-                  </p:par>
-                </p:childTnLst>
-              </p:cTn>
-              <p:prevCondLst>
-                <p:cond evt="onPrev" delay="0">
-                  <p:tgtEl>
-                    <p:sldTgt/>
-                  </p:tgtEl>
-                </p:cond>
-              </p:prevCondLst>
-              <p:nextCondLst>
-                <p:cond evt="onNext" delay="0">
-                  <p:tgtEl>
-                    <p:sldTgt/>
-                  </p:tgtEl>
-                </p:cond>
-              </p:nextCondLst>
-            </p:seq>
-          </p:childTnLst>
-        </p:cTn>
-      </p:par>
-    </p:tnLst>
-    <p:bldLst>
-      <p:bldP spid="6" grpId="0"/>
-    </p:bldLst>
-  </p:timing>
 </p:sld>
 </file>
 
@@ -23658,7 +23362,7 @@
                   <a:srgbClr val="C00000"/>
                 </a:solidFill>
               </a:rPr>
-              <a:t>True active areas are the ones associated to the three main peaks of the signal in descending order of magnitude. Hence, these are even the peaks (in modulus) considered as features.</a:t>
+              <a:t>True active areas are the ones associated to the three main peaks of the signal in descending order of magnitude. Hence, these are the peaks (in modulus) considered as features.</a:t>
             </a:r>
           </a:p>
           <a:p>
@@ -24801,9 +24505,6 @@
                     <p:cTn id="3" fill="hold">
                       <p:stCondLst>
                         <p:cond delay="indefinite"/>
-                        <p:cond evt="onBegin" delay="0">
-                          <p:tn val="2"/>
-                        </p:cond>
                       </p:stCondLst>
                       <p:childTnLst>
                         <p:par>
@@ -24813,7 +24514,7 @@
                             </p:stCondLst>
                             <p:childTnLst>
                               <p:par>
-                                <p:cTn id="5" presetID="2" presetClass="entr" presetSubtype="4" fill="hold" nodeType="withEffect">
+                                <p:cTn id="5" presetID="2" presetClass="entr" presetSubtype="4" fill="hold" nodeType="clickEffect">
                                   <p:stCondLst>
                                     <p:cond delay="0"/>
                                   </p:stCondLst>
@@ -24828,7 +24529,7 @@
                                         <p:tgtEl>
                                           <p:spTgt spid="5">
                                             <p:txEl>
-                                              <p:pRg st="6" end="6"/>
+                                              <p:pRg st="4" end="4"/>
                                             </p:txEl>
                                           </p:spTgt>
                                         </p:tgtEl>
@@ -24846,7 +24547,7 @@
                                         <p:tgtEl>
                                           <p:spTgt spid="5">
                                             <p:txEl>
-                                              <p:pRg st="6" end="6"/>
+                                              <p:pRg st="4" end="4"/>
                                             </p:txEl>
                                           </p:spTgt>
                                         </p:tgtEl>
@@ -24873,7 +24574,7 @@
                                         <p:tgtEl>
                                           <p:spTgt spid="5">
                                             <p:txEl>
-                                              <p:pRg st="6" end="6"/>
+                                              <p:pRg st="4" end="4"/>
                                             </p:txEl>
                                           </p:spTgt>
                                         </p:tgtEl>
@@ -24913,6 +24614,91 @@
                                         <p:tgtEl>
                                           <p:spTgt spid="5">
                                             <p:txEl>
+                                              <p:pRg st="6" end="6"/>
+                                            </p:txEl>
+                                          </p:spTgt>
+                                        </p:tgtEl>
+                                        <p:attrNameLst>
+                                          <p:attrName>style.visibility</p:attrName>
+                                        </p:attrNameLst>
+                                      </p:cBhvr>
+                                      <p:to>
+                                        <p:strVal val="visible"/>
+                                      </p:to>
+                                    </p:set>
+                                    <p:anim calcmode="lin" valueType="num">
+                                      <p:cBhvr additive="base">
+                                        <p:cTn id="11" dur="500" fill="hold"/>
+                                        <p:tgtEl>
+                                          <p:spTgt spid="5">
+                                            <p:txEl>
+                                              <p:pRg st="6" end="6"/>
+                                            </p:txEl>
+                                          </p:spTgt>
+                                        </p:tgtEl>
+                                        <p:attrNameLst>
+                                          <p:attrName>ppt_x</p:attrName>
+                                        </p:attrNameLst>
+                                      </p:cBhvr>
+                                      <p:tavLst>
+                                        <p:tav tm="0">
+                                          <p:val>
+                                            <p:strVal val="#ppt_x"/>
+                                          </p:val>
+                                        </p:tav>
+                                        <p:tav tm="100000">
+                                          <p:val>
+                                            <p:strVal val="#ppt_x"/>
+                                          </p:val>
+                                        </p:tav>
+                                      </p:tavLst>
+                                    </p:anim>
+                                    <p:anim calcmode="lin" valueType="num">
+                                      <p:cBhvr additive="base">
+                                        <p:cTn id="12" dur="500" fill="hold"/>
+                                        <p:tgtEl>
+                                          <p:spTgt spid="5">
+                                            <p:txEl>
+                                              <p:pRg st="6" end="6"/>
+                                            </p:txEl>
+                                          </p:spTgt>
+                                        </p:tgtEl>
+                                        <p:attrNameLst>
+                                          <p:attrName>ppt_y</p:attrName>
+                                        </p:attrNameLst>
+                                      </p:cBhvr>
+                                      <p:tavLst>
+                                        <p:tav tm="0">
+                                          <p:val>
+                                            <p:strVal val="1+#ppt_h/2"/>
+                                          </p:val>
+                                        </p:tav>
+                                        <p:tav tm="100000">
+                                          <p:val>
+                                            <p:strVal val="#ppt_y"/>
+                                          </p:val>
+                                        </p:tav>
+                                      </p:tavLst>
+                                    </p:anim>
+                                  </p:childTnLst>
+                                </p:cTn>
+                              </p:par>
+                              <p:par>
+                                <p:cTn id="13" presetID="2" presetClass="entr" presetSubtype="4" fill="hold" nodeType="withEffect">
+                                  <p:stCondLst>
+                                    <p:cond delay="0"/>
+                                  </p:stCondLst>
+                                  <p:childTnLst>
+                                    <p:set>
+                                      <p:cBhvr>
+                                        <p:cTn id="14" dur="1" fill="hold">
+                                          <p:stCondLst>
+                                            <p:cond delay="0"/>
+                                          </p:stCondLst>
+                                        </p:cTn>
+                                        <p:tgtEl>
+                                          <p:spTgt spid="5">
+                                            <p:txEl>
                                               <p:pRg st="8" end="8"/>
                                             </p:txEl>
                                           </p:spTgt>
@@ -24927,7 +24713,7 @@
                                     </p:set>
                                     <p:anim calcmode="lin" valueType="num">
                                       <p:cBhvr additive="base">
-                                        <p:cTn id="11" dur="500" fill="hold"/>
+                                        <p:cTn id="15" dur="500" fill="hold"/>
                                         <p:tgtEl>
                                           <p:spTgt spid="5">
                                             <p:txEl>
@@ -24954,7 +24740,7 @@
                                     </p:anim>
                                     <p:anim calcmode="lin" valueType="num">
                                       <p:cBhvr additive="base">
-                                        <p:cTn id="12" dur="500" fill="hold"/>
+                                        <p:cTn id="16" dur="500" fill="hold"/>
                                         <p:tgtEl>
                                           <p:spTgt spid="5">
                                             <p:txEl>
@@ -24979,6 +24765,111 @@
                                         </p:tav>
                                       </p:tavLst>
                                     </p:anim>
+                                  </p:childTnLst>
+                                </p:cTn>
+                              </p:par>
+                              <p:par>
+                                <p:cTn id="17" presetID="10" presetClass="entr" presetSubtype="0" fill="hold" grpId="0" nodeType="withEffect">
+                                  <p:stCondLst>
+                                    <p:cond delay="0"/>
+                                  </p:stCondLst>
+                                  <p:childTnLst>
+                                    <p:set>
+                                      <p:cBhvr>
+                                        <p:cTn id="18" dur="1" fill="hold">
+                                          <p:stCondLst>
+                                            <p:cond delay="0"/>
+                                          </p:stCondLst>
+                                        </p:cTn>
+                                        <p:tgtEl>
+                                          <p:spTgt spid="11"/>
+                                        </p:tgtEl>
+                                        <p:attrNameLst>
+                                          <p:attrName>style.visibility</p:attrName>
+                                        </p:attrNameLst>
+                                      </p:cBhvr>
+                                      <p:to>
+                                        <p:strVal val="visible"/>
+                                      </p:to>
+                                    </p:set>
+                                    <p:animEffect transition="in" filter="fade">
+                                      <p:cBhvr>
+                                        <p:cTn id="19" dur="500"/>
+                                        <p:tgtEl>
+                                          <p:spTgt spid="11"/>
+                                        </p:tgtEl>
+                                      </p:cBhvr>
+                                    </p:animEffect>
+                                  </p:childTnLst>
+                                </p:cTn>
+                              </p:par>
+                              <p:par>
+                                <p:cTn id="20" presetID="10" presetClass="entr" presetSubtype="0" fill="hold" grpId="0" nodeType="withEffect">
+                                  <p:stCondLst>
+                                    <p:cond delay="0"/>
+                                  </p:stCondLst>
+                                  <p:childTnLst>
+                                    <p:set>
+                                      <p:cBhvr>
+                                        <p:cTn id="21" dur="1" fill="hold">
+                                          <p:stCondLst>
+                                            <p:cond delay="0"/>
+                                          </p:stCondLst>
+                                        </p:cTn>
+                                        <p:tgtEl>
+                                          <p:spTgt spid="9"/>
+                                        </p:tgtEl>
+                                        <p:attrNameLst>
+                                          <p:attrName>style.visibility</p:attrName>
+                                        </p:attrNameLst>
+                                      </p:cBhvr>
+                                      <p:to>
+                                        <p:strVal val="visible"/>
+                                      </p:to>
+                                    </p:set>
+                                    <p:animEffect transition="in" filter="fade">
+                                      <p:cBhvr>
+                                        <p:cTn id="22" dur="500"/>
+                                        <p:tgtEl>
+                                          <p:spTgt spid="9"/>
+                                        </p:tgtEl>
+                                      </p:cBhvr>
+                                    </p:animEffect>
+                                  </p:childTnLst>
+                                </p:cTn>
+                              </p:par>
+                              <p:par>
+                                <p:cTn id="23" presetID="10" presetClass="entr" presetSubtype="0" fill="hold" grpId="0" nodeType="withEffect">
+                                  <p:stCondLst>
+                                    <p:cond delay="0"/>
+                                  </p:stCondLst>
+                                  <p:childTnLst>
+                                    <p:set>
+                                      <p:cBhvr>
+                                        <p:cTn id="24" dur="1" fill="hold">
+                                          <p:stCondLst>
+                                            <p:cond delay="0"/>
+                                          </p:stCondLst>
+                                        </p:cTn>
+                                        <p:tgtEl>
+                                          <p:spTgt spid="10"/>
+                                        </p:tgtEl>
+                                        <p:attrNameLst>
+                                          <p:attrName>style.visibility</p:attrName>
+                                        </p:attrNameLst>
+                                      </p:cBhvr>
+                                      <p:to>
+                                        <p:strVal val="visible"/>
+                                      </p:to>
+                                    </p:set>
+                                    <p:animEffect transition="in" filter="fade">
+                                      <p:cBhvr>
+                                        <p:cTn id="25" dur="500"/>
+                                        <p:tgtEl>
+                                          <p:spTgt spid="10"/>
+                                        </p:tgtEl>
+                                      </p:cBhvr>
+                                    </p:animEffect>
                                   </p:childTnLst>
                                 </p:cTn>
                               </p:par>
@@ -25009,6 +24900,11 @@
         </p:cTn>
       </p:par>
     </p:tnLst>
+    <p:bldLst>
+      <p:bldP spid="9" grpId="0"/>
+      <p:bldP spid="10" grpId="0"/>
+      <p:bldP spid="11" grpId="0"/>
+    </p:bldLst>
   </p:timing>
 </p:sld>
 </file>
@@ -28271,7 +28167,7 @@
                   </a:schemeClr>
                 </a:solidFill>
               </a:rPr>
-              <a:t>Envelope feature</a:t>
+              <a:t>Envelope features</a:t>
             </a:r>
           </a:p>
           <a:p>

</xml_diff>

<commit_message>
new features set analysis (v3)
</commit_message>
<xml_diff>
--- a/Documentation/9. Features and classification results V2.pptx
+++ b/Documentation/9. Features and classification results V2.pptx
@@ -5,7 +5,7 @@
     <p:sldMasterId id="2147483661" r:id="rId1"/>
   </p:sldMasterIdLst>
   <p:notesMasterIdLst>
-    <p:notesMasterId r:id="rId31"/>
+    <p:notesMasterId r:id="rId32"/>
   </p:notesMasterIdLst>
   <p:sldIdLst>
     <p:sldId id="573" r:id="rId2"/>
@@ -31,12 +31,13 @@
     <p:sldId id="720" r:id="rId22"/>
     <p:sldId id="721" r:id="rId23"/>
     <p:sldId id="734" r:id="rId24"/>
-    <p:sldId id="733" r:id="rId25"/>
-    <p:sldId id="729" r:id="rId26"/>
-    <p:sldId id="724" r:id="rId27"/>
-    <p:sldId id="730" r:id="rId28"/>
-    <p:sldId id="747" r:id="rId29"/>
-    <p:sldId id="638" r:id="rId30"/>
+    <p:sldId id="748" r:id="rId25"/>
+    <p:sldId id="733" r:id="rId26"/>
+    <p:sldId id="729" r:id="rId27"/>
+    <p:sldId id="724" r:id="rId28"/>
+    <p:sldId id="730" r:id="rId29"/>
+    <p:sldId id="747" r:id="rId30"/>
+    <p:sldId id="638" r:id="rId31"/>
   </p:sldIdLst>
   <p:sldSz cx="12192000" cy="6858000"/>
   <p:notesSz cx="6858000" cy="9144000"/>
@@ -236,7 +237,7 @@
           <a:p>
             <a:fld id="{1A21894F-B278-4D96-9594-A030EA633187}" type="datetimeFigureOut">
               <a:rPr lang="it-IT" smtClean="0"/>
-              <a:t>09/12/2024</a:t>
+              <a:t>11/12/2024</a:t>
             </a:fld>
             <a:endParaRPr lang="it-IT"/>
           </a:p>
@@ -2023,6 +2024,114 @@
         <p:cNvPr id="1" name="">
           <a:extLst>
             <a:ext uri="{FF2B5EF4-FFF2-40B4-BE49-F238E27FC236}">
+              <a16:creationId xmlns:a16="http://schemas.microsoft.com/office/drawing/2014/main" id="{6C0BFF2B-03E0-1C33-C8E1-7743C90D1A66}"/>
+            </a:ext>
+          </a:extLst>
+        </p:cNvPr>
+        <p:cNvGrpSpPr/>
+        <p:nvPr/>
+      </p:nvGrpSpPr>
+      <p:grpSpPr>
+        <a:xfrm>
+          <a:off x="0" y="0"/>
+          <a:ext cx="0" cy="0"/>
+          <a:chOff x="0" y="0"/>
+          <a:chExt cx="0" cy="0"/>
+        </a:xfrm>
+      </p:grpSpPr>
+      <p:sp>
+        <p:nvSpPr>
+          <p:cNvPr id="2" name="Segnaposto immagine diapositiva 1">
+            <a:extLst>
+              <a:ext uri="{FF2B5EF4-FFF2-40B4-BE49-F238E27FC236}">
+                <a16:creationId xmlns:a16="http://schemas.microsoft.com/office/drawing/2014/main" id="{6ACB5754-D717-EF7F-0BA9-6347769BDC1F}"/>
+              </a:ext>
+            </a:extLst>
+          </p:cNvPr>
+          <p:cNvSpPr>
+            <a:spLocks noGrp="1" noRot="1" noChangeAspect="1"/>
+          </p:cNvSpPr>
+          <p:nvPr>
+            <p:ph type="sldImg"/>
+          </p:nvPr>
+        </p:nvSpPr>
+        <p:spPr/>
+      </p:sp>
+      <p:sp>
+        <p:nvSpPr>
+          <p:cNvPr id="3" name="Segnaposto note 2">
+            <a:extLst>
+              <a:ext uri="{FF2B5EF4-FFF2-40B4-BE49-F238E27FC236}">
+                <a16:creationId xmlns:a16="http://schemas.microsoft.com/office/drawing/2014/main" id="{91AC78A7-7B3C-4B97-5E30-4089D4633349}"/>
+              </a:ext>
+            </a:extLst>
+          </p:cNvPr>
+          <p:cNvSpPr>
+            <a:spLocks noGrp="1"/>
+          </p:cNvSpPr>
+          <p:nvPr>
+            <p:ph type="body" idx="1"/>
+          </p:nvPr>
+        </p:nvSpPr>
+        <p:spPr/>
+        <p:txBody>
+          <a:bodyPr/>
+          <a:lstStyle/>
+          <a:p>
+            <a:endParaRPr lang="en-US" dirty="0"/>
+          </a:p>
+        </p:txBody>
+      </p:sp>
+      <p:sp>
+        <p:nvSpPr>
+          <p:cNvPr id="4" name="Segnaposto numero diapositiva 3">
+            <a:extLst>
+              <a:ext uri="{FF2B5EF4-FFF2-40B4-BE49-F238E27FC236}">
+                <a16:creationId xmlns:a16="http://schemas.microsoft.com/office/drawing/2014/main" id="{7704E56C-3C07-183C-E5CC-5607463C6134}"/>
+              </a:ext>
+            </a:extLst>
+          </p:cNvPr>
+          <p:cNvSpPr>
+            <a:spLocks noGrp="1"/>
+          </p:cNvSpPr>
+          <p:nvPr>
+            <p:ph type="sldNum" sz="quarter" idx="5"/>
+          </p:nvPr>
+        </p:nvSpPr>
+        <p:spPr/>
+        <p:txBody>
+          <a:bodyPr/>
+          <a:lstStyle/>
+          <a:p>
+            <a:fld id="{802E5CB9-2BE2-4860-85EE-BBFABBF2603A}" type="slidenum">
+              <a:rPr lang="en-US" smtClean="0"/>
+              <a:t>24</a:t>
+            </a:fld>
+            <a:endParaRPr lang="en-US"/>
+          </a:p>
+        </p:txBody>
+      </p:sp>
+    </p:spTree>
+    <p:extLst>
+      <p:ext uri="{BB962C8B-B14F-4D97-AF65-F5344CB8AC3E}">
+        <p14:creationId xmlns:p14="http://schemas.microsoft.com/office/powerpoint/2010/main" val="1517417744"/>
+      </p:ext>
+    </p:extLst>
+  </p:cSld>
+  <p:clrMapOvr>
+    <a:masterClrMapping/>
+  </p:clrMapOvr>
+</p:notes>
+</file>
+
+<file path=ppt/notesSlides/notesSlide23.xml><?xml version="1.0" encoding="utf-8"?>
+<p:notes xmlns:a="http://schemas.openxmlformats.org/drawingml/2006/main" xmlns:r="http://schemas.openxmlformats.org/officeDocument/2006/relationships" xmlns:p="http://schemas.openxmlformats.org/presentationml/2006/main">
+  <p:cSld>
+    <p:spTree>
+      <p:nvGrpSpPr>
+        <p:cNvPr id="1" name="">
+          <a:extLst>
+            <a:ext uri="{FF2B5EF4-FFF2-40B4-BE49-F238E27FC236}">
               <a16:creationId xmlns:a16="http://schemas.microsoft.com/office/drawing/2014/main" id="{CBA45CD5-519A-F81D-AE4A-7A30BD157661}"/>
             </a:ext>
           </a:extLst>
@@ -2104,7 +2213,7 @@
           <a:p>
             <a:fld id="{802E5CB9-2BE2-4860-85EE-BBFABBF2603A}" type="slidenum">
               <a:rPr lang="en-US" smtClean="0"/>
-              <a:t>24</a:t>
+              <a:t>25</a:t>
             </a:fld>
             <a:endParaRPr lang="en-US"/>
           </a:p>
@@ -2123,7 +2232,7 @@
 </p:notes>
 </file>
 
-<file path=ppt/notesSlides/notesSlide23.xml><?xml version="1.0" encoding="utf-8"?>
+<file path=ppt/notesSlides/notesSlide24.xml><?xml version="1.0" encoding="utf-8"?>
 <p:notes xmlns:a="http://schemas.openxmlformats.org/drawingml/2006/main" xmlns:r="http://schemas.openxmlformats.org/officeDocument/2006/relationships" xmlns:p="http://schemas.openxmlformats.org/presentationml/2006/main">
   <p:cSld>
     <p:spTree>
@@ -2212,7 +2321,7 @@
           <a:p>
             <a:fld id="{802E5CB9-2BE2-4860-85EE-BBFABBF2603A}" type="slidenum">
               <a:rPr lang="en-US" smtClean="0"/>
-              <a:t>25</a:t>
+              <a:t>26</a:t>
             </a:fld>
             <a:endParaRPr lang="en-US"/>
           </a:p>
@@ -2231,7 +2340,7 @@
 </p:notes>
 </file>
 
-<file path=ppt/notesSlides/notesSlide24.xml><?xml version="1.0" encoding="utf-8"?>
+<file path=ppt/notesSlides/notesSlide25.xml><?xml version="1.0" encoding="utf-8"?>
 <p:notes xmlns:a="http://schemas.openxmlformats.org/drawingml/2006/main" xmlns:r="http://schemas.openxmlformats.org/officeDocument/2006/relationships" xmlns:p="http://schemas.openxmlformats.org/presentationml/2006/main">
   <p:cSld>
     <p:spTree>
@@ -2320,7 +2429,7 @@
           <a:p>
             <a:fld id="{802E5CB9-2BE2-4860-85EE-BBFABBF2603A}" type="slidenum">
               <a:rPr lang="en-US" smtClean="0"/>
-              <a:t>26</a:t>
+              <a:t>27</a:t>
             </a:fld>
             <a:endParaRPr lang="en-US"/>
           </a:p>
@@ -2339,7 +2448,7 @@
 </p:notes>
 </file>
 
-<file path=ppt/notesSlides/notesSlide25.xml><?xml version="1.0" encoding="utf-8"?>
+<file path=ppt/notesSlides/notesSlide26.xml><?xml version="1.0" encoding="utf-8"?>
 <p:notes xmlns:a="http://schemas.openxmlformats.org/drawingml/2006/main" xmlns:r="http://schemas.openxmlformats.org/officeDocument/2006/relationships" xmlns:p="http://schemas.openxmlformats.org/presentationml/2006/main">
   <p:cSld>
     <p:spTree>
@@ -2428,7 +2537,7 @@
           <a:p>
             <a:fld id="{802E5CB9-2BE2-4860-85EE-BBFABBF2603A}" type="slidenum">
               <a:rPr lang="en-US" smtClean="0"/>
-              <a:t>27</a:t>
+              <a:t>28</a:t>
             </a:fld>
             <a:endParaRPr lang="en-US"/>
           </a:p>
@@ -2447,7 +2556,7 @@
 </p:notes>
 </file>
 
-<file path=ppt/notesSlides/notesSlide26.xml><?xml version="1.0" encoding="utf-8"?>
+<file path=ppt/notesSlides/notesSlide27.xml><?xml version="1.0" encoding="utf-8"?>
 <p:notes xmlns:a="http://schemas.openxmlformats.org/drawingml/2006/main" xmlns:r="http://schemas.openxmlformats.org/officeDocument/2006/relationships" xmlns:p="http://schemas.openxmlformats.org/presentationml/2006/main">
   <p:cSld>
     <p:spTree>
@@ -2536,7 +2645,7 @@
           <a:p>
             <a:fld id="{802E5CB9-2BE2-4860-85EE-BBFABBF2603A}" type="slidenum">
               <a:rPr lang="en-US" smtClean="0"/>
-              <a:t>28</a:t>
+              <a:t>29</a:t>
             </a:fld>
             <a:endParaRPr lang="en-US" dirty="0"/>
           </a:p>
@@ -2555,7 +2664,7 @@
 </p:notes>
 </file>
 
-<file path=ppt/notesSlides/notesSlide27.xml><?xml version="1.0" encoding="utf-8"?>
+<file path=ppt/notesSlides/notesSlide28.xml><?xml version="1.0" encoding="utf-8"?>
 <p:notes xmlns:a="http://schemas.openxmlformats.org/drawingml/2006/main" xmlns:r="http://schemas.openxmlformats.org/officeDocument/2006/relationships" xmlns:p="http://schemas.openxmlformats.org/presentationml/2006/main">
   <p:cSld>
     <p:spTree>
@@ -2644,7 +2753,7 @@
           <a:p>
             <a:fld id="{802E5CB9-2BE2-4860-85EE-BBFABBF2603A}" type="slidenum">
               <a:rPr lang="en-US" smtClean="0"/>
-              <a:t>29</a:t>
+              <a:t>30</a:t>
             </a:fld>
             <a:endParaRPr lang="en-US"/>
           </a:p>
@@ -3856,7 +3965,7 @@
           <a:p>
             <a:fld id="{58E4D78B-0F35-4E3B-A0B9-554BA787D8A4}" type="datetime1">
               <a:rPr lang="en-US" smtClean="0"/>
-              <a:t>12/9/2024</a:t>
+              <a:t>12/11/2024</a:t>
             </a:fld>
             <a:endParaRPr lang="en-US"/>
           </a:p>
@@ -4066,7 +4175,7 @@
           <a:p>
             <a:fld id="{604487E5-BE79-4BAC-AEB7-0CE0533B5E5C}" type="datetime1">
               <a:rPr lang="en-US" smtClean="0"/>
-              <a:t>12/9/2024</a:t>
+              <a:t>12/11/2024</a:t>
             </a:fld>
             <a:endParaRPr lang="en-US"/>
           </a:p>
@@ -4266,7 +4375,7 @@
           <a:p>
             <a:fld id="{DDA7E0CB-9E21-49FD-99A0-0CD75BBC45F4}" type="datetime1">
               <a:rPr lang="en-US" smtClean="0"/>
-              <a:t>12/9/2024</a:t>
+              <a:t>12/11/2024</a:t>
             </a:fld>
             <a:endParaRPr lang="en-US"/>
           </a:p>
@@ -4542,7 +4651,7 @@
           <a:p>
             <a:fld id="{661D7149-FE96-419A-8F67-9BD351842985}" type="datetime1">
               <a:rPr lang="en-US" smtClean="0"/>
-              <a:t>12/9/2024</a:t>
+              <a:t>12/11/2024</a:t>
             </a:fld>
             <a:endParaRPr lang="en-US"/>
           </a:p>
@@ -4810,7 +4919,7 @@
           <a:p>
             <a:fld id="{6CA97CEF-DD94-4A20-85BC-5094F3EA8887}" type="datetime1">
               <a:rPr lang="en-US" smtClean="0"/>
-              <a:t>12/9/2024</a:t>
+              <a:t>12/11/2024</a:t>
             </a:fld>
             <a:endParaRPr lang="en-US"/>
           </a:p>
@@ -5225,7 +5334,7 @@
           <a:p>
             <a:fld id="{9862EB4C-45F8-47BA-B435-B6097D61B684}" type="datetime1">
               <a:rPr lang="en-US" smtClean="0"/>
-              <a:t>12/9/2024</a:t>
+              <a:t>12/11/2024</a:t>
             </a:fld>
             <a:endParaRPr lang="en-US"/>
           </a:p>
@@ -5367,7 +5476,7 @@
           <a:p>
             <a:fld id="{FA7CD0E2-B7EC-4D81-9389-8F889EE865AB}" type="datetime1">
               <a:rPr lang="en-US" smtClean="0"/>
-              <a:t>12/9/2024</a:t>
+              <a:t>12/11/2024</a:t>
             </a:fld>
             <a:endParaRPr lang="en-US"/>
           </a:p>
@@ -5480,7 +5589,7 @@
           <a:p>
             <a:fld id="{18B47F5C-7FA0-44DA-BF82-413AB90208B7}" type="datetime1">
               <a:rPr lang="en-US" smtClean="0"/>
-              <a:t>12/9/2024</a:t>
+              <a:t>12/11/2024</a:t>
             </a:fld>
             <a:endParaRPr lang="en-US"/>
           </a:p>
@@ -5793,7 +5902,7 @@
           <a:p>
             <a:fld id="{403415A8-F8BD-47CC-8D20-53798396961D}" type="datetime1">
               <a:rPr lang="en-US" smtClean="0"/>
-              <a:t>12/9/2024</a:t>
+              <a:t>12/11/2024</a:t>
             </a:fld>
             <a:endParaRPr lang="en-US"/>
           </a:p>
@@ -6082,7 +6191,7 @@
           <a:p>
             <a:fld id="{6A12F5A1-6669-4CDD-B1B4-04FFE5C41ADE}" type="datetime1">
               <a:rPr lang="en-US" smtClean="0"/>
-              <a:t>12/9/2024</a:t>
+              <a:t>12/11/2024</a:t>
             </a:fld>
             <a:endParaRPr lang="en-US"/>
           </a:p>
@@ -6286,7 +6395,7 @@
           <a:p>
             <a:fld id="{63421662-C242-4258-8799-9F32C0D7CC75}" type="datetime1">
               <a:rPr lang="en-US" smtClean="0"/>
-              <a:t>12/9/2024</a:t>
+              <a:t>12/11/2024</a:t>
             </a:fld>
             <a:endParaRPr lang="en-US"/>
           </a:p>
@@ -17502,7 +17611,7 @@
                   <a:schemeClr val="tx1"/>
                 </a:solidFill>
               </a:rPr>
-              <a:t>Tree 1: whole feature set</a:t>
+              <a:t>Tree 2: relevant features set</a:t>
             </a:r>
           </a:p>
         </p:txBody>
@@ -17685,6 +17794,214 @@
         <p:cNvPr id="1" name="">
           <a:extLst>
             <a:ext uri="{FF2B5EF4-FFF2-40B4-BE49-F238E27FC236}">
+              <a16:creationId xmlns:a16="http://schemas.microsoft.com/office/drawing/2014/main" id="{84A16037-6B01-1779-FA4C-CE4123220591}"/>
+            </a:ext>
+          </a:extLst>
+        </p:cNvPr>
+        <p:cNvGrpSpPr/>
+        <p:nvPr/>
+      </p:nvGrpSpPr>
+      <p:grpSpPr>
+        <a:xfrm>
+          <a:off x="0" y="0"/>
+          <a:ext cx="0" cy="0"/>
+          <a:chOff x="0" y="0"/>
+          <a:chExt cx="0" cy="0"/>
+        </a:xfrm>
+      </p:grpSpPr>
+      <p:sp>
+        <p:nvSpPr>
+          <p:cNvPr id="2" name="Titolo 1">
+            <a:extLst>
+              <a:ext uri="{FF2B5EF4-FFF2-40B4-BE49-F238E27FC236}">
+                <a16:creationId xmlns:a16="http://schemas.microsoft.com/office/drawing/2014/main" id="{BBDB32CD-6AFA-7D4E-216B-25A781A2F065}"/>
+              </a:ext>
+            </a:extLst>
+          </p:cNvPr>
+          <p:cNvSpPr>
+            <a:spLocks noGrp="1"/>
+          </p:cNvSpPr>
+          <p:nvPr>
+            <p:ph type="title"/>
+          </p:nvPr>
+        </p:nvSpPr>
+        <p:spPr>
+          <a:xfrm>
+            <a:off x="838200" y="209292"/>
+            <a:ext cx="9905460" cy="971551"/>
+          </a:xfrm>
+        </p:spPr>
+        <p:txBody>
+          <a:bodyPr>
+            <a:normAutofit/>
+          </a:bodyPr>
+          <a:lstStyle/>
+          <a:p>
+            <a:r>
+              <a:rPr lang="en-US" sz="3600" dirty="0"/>
+              <a:t>SHAP analysis on feature subset</a:t>
+            </a:r>
+          </a:p>
+        </p:txBody>
+      </p:sp>
+      <p:sp>
+        <p:nvSpPr>
+          <p:cNvPr id="4" name="Segnaposto numero diapositiva 3">
+            <a:extLst>
+              <a:ext uri="{FF2B5EF4-FFF2-40B4-BE49-F238E27FC236}">
+                <a16:creationId xmlns:a16="http://schemas.microsoft.com/office/drawing/2014/main" id="{C42B6020-4D00-9FA6-B56C-0DD473EDDDA3}"/>
+              </a:ext>
+            </a:extLst>
+          </p:cNvPr>
+          <p:cNvSpPr>
+            <a:spLocks noGrp="1"/>
+          </p:cNvSpPr>
+          <p:nvPr>
+            <p:ph type="sldNum" sz="quarter" idx="12"/>
+          </p:nvPr>
+        </p:nvSpPr>
+        <p:spPr/>
+        <p:txBody>
+          <a:bodyPr/>
+          <a:lstStyle/>
+          <a:p>
+            <a:fld id="{2FA0223F-D95A-431D-9A71-EDA7FA0C2F5B}" type="slidenum">
+              <a:rPr lang="en-US" smtClean="0"/>
+              <a:t>24</a:t>
+            </a:fld>
+            <a:endParaRPr lang="en-US" dirty="0"/>
+          </a:p>
+        </p:txBody>
+      </p:sp>
+      <p:pic>
+        <p:nvPicPr>
+          <p:cNvPr id="7" name="Immagine 6" descr="Immagine che contiene testo, schermata, Carattere, numero&#10;&#10;Descrizione generata automaticamente">
+            <a:extLst>
+              <a:ext uri="{FF2B5EF4-FFF2-40B4-BE49-F238E27FC236}">
+                <a16:creationId xmlns:a16="http://schemas.microsoft.com/office/drawing/2014/main" id="{BB4CA2A5-FEA4-8D79-1C75-0FDCB1354FA4}"/>
+              </a:ext>
+            </a:extLst>
+          </p:cNvPr>
+          <p:cNvPicPr>
+            <a:picLocks noChangeAspect="1"/>
+          </p:cNvPicPr>
+          <p:nvPr/>
+        </p:nvPicPr>
+        <p:blipFill>
+          <a:blip r:embed="rId3">
+            <a:extLst>
+              <a:ext uri="{28A0092B-C50C-407E-A947-70E740481C1C}">
+                <a14:useLocalDpi xmlns:a14="http://schemas.microsoft.com/office/drawing/2010/main" val="0"/>
+              </a:ext>
+            </a:extLst>
+          </a:blip>
+          <a:stretch>
+            <a:fillRect/>
+          </a:stretch>
+        </p:blipFill>
+        <p:spPr>
+          <a:xfrm>
+            <a:off x="324436" y="1499992"/>
+            <a:ext cx="4820781" cy="2471084"/>
+          </a:xfrm>
+          <a:prstGeom prst="rect">
+            <a:avLst/>
+          </a:prstGeom>
+        </p:spPr>
+      </p:pic>
+      <p:pic>
+        <p:nvPicPr>
+          <p:cNvPr id="11" name="Immagine 10" descr="Immagine che contiene testo, schermata, Carattere, numero&#10;&#10;Descrizione generata automaticamente">
+            <a:extLst>
+              <a:ext uri="{FF2B5EF4-FFF2-40B4-BE49-F238E27FC236}">
+                <a16:creationId xmlns:a16="http://schemas.microsoft.com/office/drawing/2014/main" id="{9044941C-0623-148C-9178-1F258B88DE7A}"/>
+              </a:ext>
+            </a:extLst>
+          </p:cNvPr>
+          <p:cNvPicPr>
+            <a:picLocks noChangeAspect="1"/>
+          </p:cNvPicPr>
+          <p:nvPr/>
+        </p:nvPicPr>
+        <p:blipFill>
+          <a:blip r:embed="rId4">
+            <a:extLst>
+              <a:ext uri="{28A0092B-C50C-407E-A947-70E740481C1C}">
+                <a14:useLocalDpi xmlns:a14="http://schemas.microsoft.com/office/drawing/2010/main" val="0"/>
+              </a:ext>
+            </a:extLst>
+          </a:blip>
+          <a:stretch>
+            <a:fillRect/>
+          </a:stretch>
+        </p:blipFill>
+        <p:spPr>
+          <a:xfrm>
+            <a:off x="3761991" y="3971076"/>
+            <a:ext cx="4668017" cy="2311106"/>
+          </a:xfrm>
+          <a:prstGeom prst="rect">
+            <a:avLst/>
+          </a:prstGeom>
+        </p:spPr>
+      </p:pic>
+      <p:pic>
+        <p:nvPicPr>
+          <p:cNvPr id="13" name="Immagine 12" descr="Immagine che contiene testo, schermata, Carattere, diagramma&#10;&#10;Descrizione generata automaticamente">
+            <a:extLst>
+              <a:ext uri="{FF2B5EF4-FFF2-40B4-BE49-F238E27FC236}">
+                <a16:creationId xmlns:a16="http://schemas.microsoft.com/office/drawing/2014/main" id="{ED988B9D-C5F7-60CE-BC05-B6D1C624EF67}"/>
+              </a:ext>
+            </a:extLst>
+          </p:cNvPr>
+          <p:cNvPicPr>
+            <a:picLocks noChangeAspect="1"/>
+          </p:cNvPicPr>
+          <p:nvPr/>
+        </p:nvPicPr>
+        <p:blipFill>
+          <a:blip r:embed="rId5">
+            <a:extLst>
+              <a:ext uri="{28A0092B-C50C-407E-A947-70E740481C1C}">
+                <a14:useLocalDpi xmlns:a14="http://schemas.microsoft.com/office/drawing/2010/main" val="0"/>
+              </a:ext>
+            </a:extLst>
+          </a:blip>
+          <a:stretch>
+            <a:fillRect/>
+          </a:stretch>
+        </p:blipFill>
+        <p:spPr>
+          <a:xfrm>
+            <a:off x="7046785" y="1499992"/>
+            <a:ext cx="4508685" cy="2311106"/>
+          </a:xfrm>
+          <a:prstGeom prst="rect">
+            <a:avLst/>
+          </a:prstGeom>
+        </p:spPr>
+      </p:pic>
+    </p:spTree>
+    <p:extLst>
+      <p:ext uri="{BB962C8B-B14F-4D97-AF65-F5344CB8AC3E}">
+        <p14:creationId xmlns:p14="http://schemas.microsoft.com/office/powerpoint/2010/main" val="2421940695"/>
+      </p:ext>
+    </p:extLst>
+  </p:cSld>
+  <p:clrMapOvr>
+    <a:masterClrMapping/>
+  </p:clrMapOvr>
+</p:sld>
+</file>
+
+<file path=ppt/slides/slide25.xml><?xml version="1.0" encoding="utf-8"?>
+<p:sld xmlns:a="http://schemas.openxmlformats.org/drawingml/2006/main" xmlns:r="http://schemas.openxmlformats.org/officeDocument/2006/relationships" xmlns:p="http://schemas.openxmlformats.org/presentationml/2006/main">
+  <p:cSld>
+    <p:spTree>
+      <p:nvGrpSpPr>
+        <p:cNvPr id="1" name="">
+          <a:extLst>
+            <a:ext uri="{FF2B5EF4-FFF2-40B4-BE49-F238E27FC236}">
               <a16:creationId xmlns:a16="http://schemas.microsoft.com/office/drawing/2014/main" id="{A8979ADA-E384-1FEC-DFC6-02D6FB1B2BDF}"/>
             </a:ext>
           </a:extLst>
@@ -17758,7 +18075,7 @@
           <a:p>
             <a:fld id="{2FA0223F-D95A-431D-9A71-EDA7FA0C2F5B}" type="slidenum">
               <a:rPr lang="en-US" smtClean="0"/>
-              <a:t>24</a:t>
+              <a:t>25</a:t>
             </a:fld>
             <a:endParaRPr lang="en-US" dirty="0"/>
           </a:p>
@@ -17909,8 +18226,8 @@
         </p:blipFill>
         <p:spPr>
           <a:xfrm>
-            <a:off x="6905194" y="2453772"/>
-            <a:ext cx="4385976" cy="3553159"/>
+            <a:off x="6938918" y="2406328"/>
+            <a:ext cx="4414882" cy="3635094"/>
           </a:xfrm>
           <a:prstGeom prst="rect">
             <a:avLst/>
@@ -18132,7 +18449,7 @@
 </p:sld>
 </file>
 
-<file path=ppt/slides/slide25.xml><?xml version="1.0" encoding="utf-8"?>
+<file path=ppt/slides/slide26.xml><?xml version="1.0" encoding="utf-8"?>
 <p:sld xmlns:a="http://schemas.openxmlformats.org/drawingml/2006/main" xmlns:r="http://schemas.openxmlformats.org/officeDocument/2006/relationships" xmlns:p="http://schemas.openxmlformats.org/presentationml/2006/main">
   <p:cSld>
     <p:spTree>
@@ -18213,7 +18530,7 @@
           <a:p>
             <a:fld id="{2FA0223F-D95A-431D-9A71-EDA7FA0C2F5B}" type="slidenum">
               <a:rPr lang="en-US" smtClean="0"/>
-              <a:t>25</a:t>
+              <a:t>26</a:t>
             </a:fld>
             <a:endParaRPr lang="en-US" dirty="0"/>
           </a:p>
@@ -18305,8 +18622,8 @@
         </p:blipFill>
         <p:spPr>
           <a:xfrm>
-            <a:off x="6905194" y="2453772"/>
-            <a:ext cx="4385976" cy="3553159"/>
+            <a:off x="6794456" y="2338450"/>
+            <a:ext cx="4487674" cy="3758192"/>
           </a:xfrm>
           <a:prstGeom prst="rect">
             <a:avLst/>
@@ -18530,7 +18847,7 @@
         </p:nvSpPr>
         <p:spPr>
           <a:xfrm>
-            <a:off x="7793736" y="2947416"/>
+            <a:off x="7702850" y="2947416"/>
             <a:ext cx="713232" cy="630936"/>
           </a:xfrm>
           <a:prstGeom prst="roundRect">
@@ -18584,7 +18901,7 @@
         </p:nvSpPr>
         <p:spPr>
           <a:xfrm>
-            <a:off x="8701486" y="3861054"/>
+            <a:off x="8610600" y="3861054"/>
             <a:ext cx="713232" cy="630936"/>
           </a:xfrm>
           <a:prstGeom prst="roundRect">
@@ -18638,7 +18955,7 @@
         </p:nvSpPr>
         <p:spPr>
           <a:xfrm>
-            <a:off x="9554464" y="4824476"/>
+            <a:off x="9463578" y="4824476"/>
             <a:ext cx="713232" cy="630936"/>
           </a:xfrm>
           <a:prstGeom prst="roundRect">
@@ -18692,7 +19009,7 @@
         </p:nvSpPr>
         <p:spPr>
           <a:xfrm>
-            <a:off x="7793736" y="3861054"/>
+            <a:off x="7702850" y="3861054"/>
             <a:ext cx="713232" cy="1656080"/>
           </a:xfrm>
           <a:prstGeom prst="roundRect">
@@ -18804,7 +19121,7 @@
         </p:nvSpPr>
         <p:spPr>
           <a:xfrm>
-            <a:off x="9554464" y="2947416"/>
+            <a:off x="9463578" y="2947416"/>
             <a:ext cx="713232" cy="1544574"/>
           </a:xfrm>
           <a:prstGeom prst="roundRect">
@@ -19195,7 +19512,7 @@
 </p:sld>
 </file>
 
-<file path=ppt/slides/slide26.xml><?xml version="1.0" encoding="utf-8"?>
+<file path=ppt/slides/slide27.xml><?xml version="1.0" encoding="utf-8"?>
 <p:sld xmlns:a="http://schemas.openxmlformats.org/drawingml/2006/main" xmlns:r="http://schemas.openxmlformats.org/officeDocument/2006/relationships" xmlns:p="http://schemas.openxmlformats.org/presentationml/2006/main" show="0">
   <p:cSld>
     <p:spTree>
@@ -19276,7 +19593,7 @@
           <a:p>
             <a:fld id="{2FA0223F-D95A-431D-9A71-EDA7FA0C2F5B}" type="slidenum">
               <a:rPr lang="en-US" smtClean="0"/>
-              <a:t>26</a:t>
+              <a:t>27</a:t>
             </a:fld>
             <a:endParaRPr lang="en-US" dirty="0"/>
           </a:p>
@@ -19966,7 +20283,7 @@
 </p:sld>
 </file>
 
-<file path=ppt/slides/slide27.xml><?xml version="1.0" encoding="utf-8"?>
+<file path=ppt/slides/slide28.xml><?xml version="1.0" encoding="utf-8"?>
 <p:sld xmlns:a="http://schemas.openxmlformats.org/drawingml/2006/main" xmlns:r="http://schemas.openxmlformats.org/officeDocument/2006/relationships" xmlns:p="http://schemas.openxmlformats.org/presentationml/2006/main" show="0">
   <p:cSld>
     <p:spTree>
@@ -20047,7 +20364,7 @@
           <a:p>
             <a:fld id="{2FA0223F-D95A-431D-9A71-EDA7FA0C2F5B}" type="slidenum">
               <a:rPr lang="en-US" smtClean="0"/>
-              <a:t>27</a:t>
+              <a:t>28</a:t>
             </a:fld>
             <a:endParaRPr lang="en-US" dirty="0"/>
           </a:p>
@@ -20282,7 +20599,7 @@
 </p:sld>
 </file>
 
-<file path=ppt/slides/slide28.xml><?xml version="1.0" encoding="utf-8"?>
+<file path=ppt/slides/slide29.xml><?xml version="1.0" encoding="utf-8"?>
 <p:sld xmlns:a="http://schemas.openxmlformats.org/drawingml/2006/main" xmlns:r="http://schemas.openxmlformats.org/officeDocument/2006/relationships" xmlns:p="http://schemas.openxmlformats.org/presentationml/2006/main">
   <p:cSld>
     <p:spTree>
@@ -20493,7 +20810,7 @@
           <a:p>
             <a:fld id="{2FA0223F-D95A-431D-9A71-EDA7FA0C2F5B}" type="slidenum">
               <a:rPr lang="en-US" smtClean="0"/>
-              <a:t>28</a:t>
+              <a:t>29</a:t>
             </a:fld>
             <a:endParaRPr lang="en-US" dirty="0"/>
           </a:p>
@@ -20512,7 +20829,231 @@
 </p:sld>
 </file>
 
-<file path=ppt/slides/slide29.xml><?xml version="1.0" encoding="utf-8"?>
+<file path=ppt/slides/slide3.xml><?xml version="1.0" encoding="utf-8"?>
+<p:sld xmlns:a="http://schemas.openxmlformats.org/drawingml/2006/main" xmlns:r="http://schemas.openxmlformats.org/officeDocument/2006/relationships" xmlns:p="http://schemas.openxmlformats.org/presentationml/2006/main">
+  <p:cSld>
+    <p:spTree>
+      <p:nvGrpSpPr>
+        <p:cNvPr id="1" name="">
+          <a:extLst>
+            <a:ext uri="{FF2B5EF4-FFF2-40B4-BE49-F238E27FC236}">
+              <a16:creationId xmlns:a16="http://schemas.microsoft.com/office/drawing/2014/main" id="{EA7E2220-81EB-8D81-3516-6EF00AABC069}"/>
+            </a:ext>
+          </a:extLst>
+        </p:cNvPr>
+        <p:cNvGrpSpPr/>
+        <p:nvPr/>
+      </p:nvGrpSpPr>
+      <p:grpSpPr>
+        <a:xfrm>
+          <a:off x="0" y="0"/>
+          <a:ext cx="0" cy="0"/>
+          <a:chOff x="0" y="0"/>
+          <a:chExt cx="0" cy="0"/>
+        </a:xfrm>
+      </p:grpSpPr>
+      <p:sp>
+        <p:nvSpPr>
+          <p:cNvPr id="2" name="Titolo 1">
+            <a:extLst>
+              <a:ext uri="{FF2B5EF4-FFF2-40B4-BE49-F238E27FC236}">
+                <a16:creationId xmlns:a16="http://schemas.microsoft.com/office/drawing/2014/main" id="{DEA1DBFB-1B0E-E0F8-39C1-1A5DEC112B8A}"/>
+              </a:ext>
+            </a:extLst>
+          </p:cNvPr>
+          <p:cNvSpPr>
+            <a:spLocks noGrp="1"/>
+          </p:cNvSpPr>
+          <p:nvPr>
+            <p:ph type="title"/>
+          </p:nvPr>
+        </p:nvSpPr>
+        <p:spPr/>
+        <p:txBody>
+          <a:bodyPr/>
+          <a:lstStyle/>
+          <a:p>
+            <a:r>
+              <a:rPr lang="en-US" dirty="0"/>
+              <a:t>Outline </a:t>
+            </a:r>
+          </a:p>
+        </p:txBody>
+      </p:sp>
+      <p:sp>
+        <p:nvSpPr>
+          <p:cNvPr id="3" name="Segnaposto contenuto 2">
+            <a:extLst>
+              <a:ext uri="{FF2B5EF4-FFF2-40B4-BE49-F238E27FC236}">
+                <a16:creationId xmlns:a16="http://schemas.microsoft.com/office/drawing/2014/main" id="{148A07B1-1A9B-5A48-CB8C-3690ADB27422}"/>
+              </a:ext>
+            </a:extLst>
+          </p:cNvPr>
+          <p:cNvSpPr>
+            <a:spLocks noGrp="1"/>
+          </p:cNvSpPr>
+          <p:nvPr>
+            <p:ph idx="1"/>
+          </p:nvPr>
+        </p:nvSpPr>
+        <p:spPr>
+          <a:xfrm>
+            <a:off x="664464" y="2041496"/>
+            <a:ext cx="10098024" cy="3851303"/>
+          </a:xfrm>
+        </p:spPr>
+        <p:txBody>
+          <a:bodyPr>
+            <a:noAutofit/>
+          </a:bodyPr>
+          <a:lstStyle/>
+          <a:p>
+            <a:r>
+              <a:rPr lang="en-US" sz="2000" dirty="0"/>
+              <a:t>Feature extraction </a:t>
+            </a:r>
+          </a:p>
+          <a:p>
+            <a:pPr lvl="1"/>
+            <a:r>
+              <a:rPr lang="en-US" sz="2000" dirty="0"/>
+              <a:t>Envelope features</a:t>
+            </a:r>
+          </a:p>
+          <a:p>
+            <a:pPr lvl="1"/>
+            <a:r>
+              <a:rPr lang="en-US" sz="2000" dirty="0">
+                <a:solidFill>
+                  <a:schemeClr val="bg2">
+                    <a:lumMod val="75000"/>
+                  </a:schemeClr>
+                </a:solidFill>
+              </a:rPr>
+              <a:t>Template matching features</a:t>
+            </a:r>
+          </a:p>
+          <a:p>
+            <a:pPr lvl="1"/>
+            <a:r>
+              <a:rPr lang="en-US" sz="2000" dirty="0">
+                <a:solidFill>
+                  <a:schemeClr val="bg2">
+                    <a:lumMod val="75000"/>
+                  </a:schemeClr>
+                </a:solidFill>
+              </a:rPr>
+              <a:t>Short time Fourier transformation definition and analysis</a:t>
+            </a:r>
+          </a:p>
+          <a:p>
+            <a:r>
+              <a:rPr lang="en-US" sz="2000" dirty="0">
+                <a:solidFill>
+                  <a:schemeClr val="bg2">
+                    <a:lumMod val="75000"/>
+                  </a:schemeClr>
+                </a:solidFill>
+              </a:rPr>
+              <a:t>Classification</a:t>
+            </a:r>
+          </a:p>
+          <a:p>
+            <a:pPr lvl="1"/>
+            <a:r>
+              <a:rPr lang="en-US" sz="2000" dirty="0">
+                <a:solidFill>
+                  <a:schemeClr val="bg2">
+                    <a:lumMod val="75000"/>
+                  </a:schemeClr>
+                </a:solidFill>
+              </a:rPr>
+              <a:t>Knowledge based classifier: recap</a:t>
+            </a:r>
+          </a:p>
+          <a:p>
+            <a:pPr lvl="1"/>
+            <a:r>
+              <a:rPr lang="en-US" sz="2000" dirty="0">
+                <a:solidFill>
+                  <a:schemeClr val="bg2">
+                    <a:lumMod val="75000"/>
+                  </a:schemeClr>
+                </a:solidFill>
+              </a:rPr>
+              <a:t>Improved Knowledge based classifier</a:t>
+            </a:r>
+          </a:p>
+          <a:p>
+            <a:pPr lvl="1"/>
+            <a:r>
+              <a:rPr lang="en-US" sz="2000" dirty="0">
+                <a:solidFill>
+                  <a:schemeClr val="bg2">
+                    <a:lumMod val="75000"/>
+                  </a:schemeClr>
+                </a:solidFill>
+              </a:rPr>
+              <a:t>Tree classifier: whole set of features optimal subset of features</a:t>
+            </a:r>
+          </a:p>
+          <a:p>
+            <a:r>
+              <a:rPr lang="en-US" sz="2000" dirty="0">
+                <a:solidFill>
+                  <a:schemeClr val="bg2">
+                    <a:lumMod val="75000"/>
+                  </a:schemeClr>
+                </a:solidFill>
+              </a:rPr>
+              <a:t>Conclusions</a:t>
+            </a:r>
+          </a:p>
+        </p:txBody>
+      </p:sp>
+      <p:sp>
+        <p:nvSpPr>
+          <p:cNvPr id="4" name="Segnaposto numero diapositiva 3">
+            <a:extLst>
+              <a:ext uri="{FF2B5EF4-FFF2-40B4-BE49-F238E27FC236}">
+                <a16:creationId xmlns:a16="http://schemas.microsoft.com/office/drawing/2014/main" id="{5D78098F-754C-D4E4-BBF0-C4271D17CBD9}"/>
+              </a:ext>
+            </a:extLst>
+          </p:cNvPr>
+          <p:cNvSpPr>
+            <a:spLocks noGrp="1"/>
+          </p:cNvSpPr>
+          <p:nvPr>
+            <p:ph type="sldNum" sz="quarter" idx="12"/>
+          </p:nvPr>
+        </p:nvSpPr>
+        <p:spPr/>
+        <p:txBody>
+          <a:bodyPr/>
+          <a:lstStyle/>
+          <a:p>
+            <a:fld id="{2FA0223F-D95A-431D-9A71-EDA7FA0C2F5B}" type="slidenum">
+              <a:rPr lang="en-US" smtClean="0"/>
+              <a:t>3</a:t>
+            </a:fld>
+            <a:endParaRPr lang="en-US" dirty="0"/>
+          </a:p>
+        </p:txBody>
+      </p:sp>
+    </p:spTree>
+    <p:extLst>
+      <p:ext uri="{BB962C8B-B14F-4D97-AF65-F5344CB8AC3E}">
+        <p14:creationId xmlns:p14="http://schemas.microsoft.com/office/powerpoint/2010/main" val="3404771171"/>
+      </p:ext>
+    </p:extLst>
+  </p:cSld>
+  <p:clrMapOvr>
+    <a:masterClrMapping/>
+  </p:clrMapOvr>
+</p:sld>
+</file>
+
+<file path=ppt/slides/slide30.xml><?xml version="1.0" encoding="utf-8"?>
 <p:sld xmlns:a="http://schemas.openxmlformats.org/drawingml/2006/main" xmlns:r="http://schemas.openxmlformats.org/officeDocument/2006/relationships" xmlns:p="http://schemas.openxmlformats.org/presentationml/2006/main">
   <p:cSld>
     <p:spTree>
@@ -20593,7 +21134,7 @@
           <a:p>
             <a:fld id="{2FA0223F-D95A-431D-9A71-EDA7FA0C2F5B}" type="slidenum">
               <a:rPr lang="en-US" smtClean="0"/>
-              <a:t>29</a:t>
+              <a:t>30</a:t>
             </a:fld>
             <a:endParaRPr lang="en-US"/>
           </a:p>
@@ -20892,230 +21433,6 @@
     <p:extLst>
       <p:ext uri="{BB962C8B-B14F-4D97-AF65-F5344CB8AC3E}">
         <p14:creationId xmlns:p14="http://schemas.microsoft.com/office/powerpoint/2010/main" val="3793055474"/>
-      </p:ext>
-    </p:extLst>
-  </p:cSld>
-  <p:clrMapOvr>
-    <a:masterClrMapping/>
-  </p:clrMapOvr>
-</p:sld>
-</file>
-
-<file path=ppt/slides/slide3.xml><?xml version="1.0" encoding="utf-8"?>
-<p:sld xmlns:a="http://schemas.openxmlformats.org/drawingml/2006/main" xmlns:r="http://schemas.openxmlformats.org/officeDocument/2006/relationships" xmlns:p="http://schemas.openxmlformats.org/presentationml/2006/main">
-  <p:cSld>
-    <p:spTree>
-      <p:nvGrpSpPr>
-        <p:cNvPr id="1" name="">
-          <a:extLst>
-            <a:ext uri="{FF2B5EF4-FFF2-40B4-BE49-F238E27FC236}">
-              <a16:creationId xmlns:a16="http://schemas.microsoft.com/office/drawing/2014/main" id="{EA7E2220-81EB-8D81-3516-6EF00AABC069}"/>
-            </a:ext>
-          </a:extLst>
-        </p:cNvPr>
-        <p:cNvGrpSpPr/>
-        <p:nvPr/>
-      </p:nvGrpSpPr>
-      <p:grpSpPr>
-        <a:xfrm>
-          <a:off x="0" y="0"/>
-          <a:ext cx="0" cy="0"/>
-          <a:chOff x="0" y="0"/>
-          <a:chExt cx="0" cy="0"/>
-        </a:xfrm>
-      </p:grpSpPr>
-      <p:sp>
-        <p:nvSpPr>
-          <p:cNvPr id="2" name="Titolo 1">
-            <a:extLst>
-              <a:ext uri="{FF2B5EF4-FFF2-40B4-BE49-F238E27FC236}">
-                <a16:creationId xmlns:a16="http://schemas.microsoft.com/office/drawing/2014/main" id="{DEA1DBFB-1B0E-E0F8-39C1-1A5DEC112B8A}"/>
-              </a:ext>
-            </a:extLst>
-          </p:cNvPr>
-          <p:cNvSpPr>
-            <a:spLocks noGrp="1"/>
-          </p:cNvSpPr>
-          <p:nvPr>
-            <p:ph type="title"/>
-          </p:nvPr>
-        </p:nvSpPr>
-        <p:spPr/>
-        <p:txBody>
-          <a:bodyPr/>
-          <a:lstStyle/>
-          <a:p>
-            <a:r>
-              <a:rPr lang="en-US" dirty="0"/>
-              <a:t>Outline </a:t>
-            </a:r>
-          </a:p>
-        </p:txBody>
-      </p:sp>
-      <p:sp>
-        <p:nvSpPr>
-          <p:cNvPr id="3" name="Segnaposto contenuto 2">
-            <a:extLst>
-              <a:ext uri="{FF2B5EF4-FFF2-40B4-BE49-F238E27FC236}">
-                <a16:creationId xmlns:a16="http://schemas.microsoft.com/office/drawing/2014/main" id="{148A07B1-1A9B-5A48-CB8C-3690ADB27422}"/>
-              </a:ext>
-            </a:extLst>
-          </p:cNvPr>
-          <p:cNvSpPr>
-            <a:spLocks noGrp="1"/>
-          </p:cNvSpPr>
-          <p:nvPr>
-            <p:ph idx="1"/>
-          </p:nvPr>
-        </p:nvSpPr>
-        <p:spPr>
-          <a:xfrm>
-            <a:off x="664464" y="2041496"/>
-            <a:ext cx="10098024" cy="3851303"/>
-          </a:xfrm>
-        </p:spPr>
-        <p:txBody>
-          <a:bodyPr>
-            <a:noAutofit/>
-          </a:bodyPr>
-          <a:lstStyle/>
-          <a:p>
-            <a:r>
-              <a:rPr lang="en-US" sz="2000" dirty="0"/>
-              <a:t>Feature extraction </a:t>
-            </a:r>
-          </a:p>
-          <a:p>
-            <a:pPr lvl="1"/>
-            <a:r>
-              <a:rPr lang="en-US" sz="2000" dirty="0"/>
-              <a:t>Envelope features</a:t>
-            </a:r>
-          </a:p>
-          <a:p>
-            <a:pPr lvl="1"/>
-            <a:r>
-              <a:rPr lang="en-US" sz="2000" dirty="0">
-                <a:solidFill>
-                  <a:schemeClr val="bg2">
-                    <a:lumMod val="75000"/>
-                  </a:schemeClr>
-                </a:solidFill>
-              </a:rPr>
-              <a:t>Template matching features</a:t>
-            </a:r>
-          </a:p>
-          <a:p>
-            <a:pPr lvl="1"/>
-            <a:r>
-              <a:rPr lang="en-US" sz="2000" dirty="0">
-                <a:solidFill>
-                  <a:schemeClr val="bg2">
-                    <a:lumMod val="75000"/>
-                  </a:schemeClr>
-                </a:solidFill>
-              </a:rPr>
-              <a:t>Short time Fourier transformation definition and analysis</a:t>
-            </a:r>
-          </a:p>
-          <a:p>
-            <a:r>
-              <a:rPr lang="en-US" sz="2000" dirty="0">
-                <a:solidFill>
-                  <a:schemeClr val="bg2">
-                    <a:lumMod val="75000"/>
-                  </a:schemeClr>
-                </a:solidFill>
-              </a:rPr>
-              <a:t>Classification</a:t>
-            </a:r>
-          </a:p>
-          <a:p>
-            <a:pPr lvl="1"/>
-            <a:r>
-              <a:rPr lang="en-US" sz="2000" dirty="0">
-                <a:solidFill>
-                  <a:schemeClr val="bg2">
-                    <a:lumMod val="75000"/>
-                  </a:schemeClr>
-                </a:solidFill>
-              </a:rPr>
-              <a:t>Knowledge based classifier: recap</a:t>
-            </a:r>
-          </a:p>
-          <a:p>
-            <a:pPr lvl="1"/>
-            <a:r>
-              <a:rPr lang="en-US" sz="2000" dirty="0">
-                <a:solidFill>
-                  <a:schemeClr val="bg2">
-                    <a:lumMod val="75000"/>
-                  </a:schemeClr>
-                </a:solidFill>
-              </a:rPr>
-              <a:t>Improved Knowledge based classifier</a:t>
-            </a:r>
-          </a:p>
-          <a:p>
-            <a:pPr lvl="1"/>
-            <a:r>
-              <a:rPr lang="en-US" sz="2000" dirty="0">
-                <a:solidFill>
-                  <a:schemeClr val="bg2">
-                    <a:lumMod val="75000"/>
-                  </a:schemeClr>
-                </a:solidFill>
-              </a:rPr>
-              <a:t>Tree classifier: whole set of features optimal subset of features</a:t>
-            </a:r>
-          </a:p>
-          <a:p>
-            <a:r>
-              <a:rPr lang="en-US" sz="2000" dirty="0">
-                <a:solidFill>
-                  <a:schemeClr val="bg2">
-                    <a:lumMod val="75000"/>
-                  </a:schemeClr>
-                </a:solidFill>
-              </a:rPr>
-              <a:t>Conclusions</a:t>
-            </a:r>
-          </a:p>
-        </p:txBody>
-      </p:sp>
-      <p:sp>
-        <p:nvSpPr>
-          <p:cNvPr id="4" name="Segnaposto numero diapositiva 3">
-            <a:extLst>
-              <a:ext uri="{FF2B5EF4-FFF2-40B4-BE49-F238E27FC236}">
-                <a16:creationId xmlns:a16="http://schemas.microsoft.com/office/drawing/2014/main" id="{5D78098F-754C-D4E4-BBF0-C4271D17CBD9}"/>
-              </a:ext>
-            </a:extLst>
-          </p:cNvPr>
-          <p:cNvSpPr>
-            <a:spLocks noGrp="1"/>
-          </p:cNvSpPr>
-          <p:nvPr>
-            <p:ph type="sldNum" sz="quarter" idx="12"/>
-          </p:nvPr>
-        </p:nvSpPr>
-        <p:spPr/>
-        <p:txBody>
-          <a:bodyPr/>
-          <a:lstStyle/>
-          <a:p>
-            <a:fld id="{2FA0223F-D95A-431D-9A71-EDA7FA0C2F5B}" type="slidenum">
-              <a:rPr lang="en-US" smtClean="0"/>
-              <a:t>3</a:t>
-            </a:fld>
-            <a:endParaRPr lang="en-US" dirty="0"/>
-          </a:p>
-        </p:txBody>
-      </p:sp>
-    </p:spTree>
-    <p:extLst>
-      <p:ext uri="{BB962C8B-B14F-4D97-AF65-F5344CB8AC3E}">
-        <p14:creationId xmlns:p14="http://schemas.microsoft.com/office/powerpoint/2010/main" val="3404771171"/>
       </p:ext>
     </p:extLst>
   </p:cSld>

</xml_diff>